<commit_message>
add chinese version of pin_map
</commit_message>
<xml_diff>
--- a/img/pin_map_2040.pptx
+++ b/img/pin_map_2040.pptx
@@ -7,6 +7,8 @@
   <p:sldIdLst>
     <p:sldId id="259" r:id="rId2"/>
     <p:sldId id="261" r:id="rId3"/>
+    <p:sldId id="262" r:id="rId4"/>
+    <p:sldId id="263" r:id="rId5"/>
   </p:sldIdLst>
   <p:sldSz cx="12192000" cy="6858000"/>
   <p:notesSz cx="6858000" cy="9144000"/>
@@ -274,7 +276,7 @@
           <a:p>
             <a:fld id="{6BAEC7DB-416E-4648-AE31-15D6F0A9A9FB}" type="datetimeFigureOut">
               <a:rPr lang="en-US" smtClean="0"/>
-              <a:t>9/10/2018</a:t>
+              <a:t>9/21/2018</a:t>
             </a:fld>
             <a:endParaRPr lang="en-US"/>
           </a:p>
@@ -474,7 +476,7 @@
           <a:p>
             <a:fld id="{6BAEC7DB-416E-4648-AE31-15D6F0A9A9FB}" type="datetimeFigureOut">
               <a:rPr lang="en-US" smtClean="0"/>
-              <a:t>9/10/2018</a:t>
+              <a:t>9/21/2018</a:t>
             </a:fld>
             <a:endParaRPr lang="en-US"/>
           </a:p>
@@ -684,7 +686,7 @@
           <a:p>
             <a:fld id="{6BAEC7DB-416E-4648-AE31-15D6F0A9A9FB}" type="datetimeFigureOut">
               <a:rPr lang="en-US" smtClean="0"/>
-              <a:t>9/10/2018</a:t>
+              <a:t>9/21/2018</a:t>
             </a:fld>
             <a:endParaRPr lang="en-US"/>
           </a:p>
@@ -884,7 +886,7 @@
           <a:p>
             <a:fld id="{6BAEC7DB-416E-4648-AE31-15D6F0A9A9FB}" type="datetimeFigureOut">
               <a:rPr lang="en-US" smtClean="0"/>
-              <a:t>9/10/2018</a:t>
+              <a:t>9/21/2018</a:t>
             </a:fld>
             <a:endParaRPr lang="en-US"/>
           </a:p>
@@ -1160,7 +1162,7 @@
           <a:p>
             <a:fld id="{6BAEC7DB-416E-4648-AE31-15D6F0A9A9FB}" type="datetimeFigureOut">
               <a:rPr lang="en-US" smtClean="0"/>
-              <a:t>9/10/2018</a:t>
+              <a:t>9/21/2018</a:t>
             </a:fld>
             <a:endParaRPr lang="en-US"/>
           </a:p>
@@ -1428,7 +1430,7 @@
           <a:p>
             <a:fld id="{6BAEC7DB-416E-4648-AE31-15D6F0A9A9FB}" type="datetimeFigureOut">
               <a:rPr lang="en-US" smtClean="0"/>
-              <a:t>9/10/2018</a:t>
+              <a:t>9/21/2018</a:t>
             </a:fld>
             <a:endParaRPr lang="en-US"/>
           </a:p>
@@ -1843,7 +1845,7 @@
           <a:p>
             <a:fld id="{6BAEC7DB-416E-4648-AE31-15D6F0A9A9FB}" type="datetimeFigureOut">
               <a:rPr lang="en-US" smtClean="0"/>
-              <a:t>9/10/2018</a:t>
+              <a:t>9/21/2018</a:t>
             </a:fld>
             <a:endParaRPr lang="en-US"/>
           </a:p>
@@ -1985,7 +1987,7 @@
           <a:p>
             <a:fld id="{6BAEC7DB-416E-4648-AE31-15D6F0A9A9FB}" type="datetimeFigureOut">
               <a:rPr lang="en-US" smtClean="0"/>
-              <a:t>9/10/2018</a:t>
+              <a:t>9/21/2018</a:t>
             </a:fld>
             <a:endParaRPr lang="en-US"/>
           </a:p>
@@ -2098,7 +2100,7 @@
           <a:p>
             <a:fld id="{6BAEC7DB-416E-4648-AE31-15D6F0A9A9FB}" type="datetimeFigureOut">
               <a:rPr lang="en-US" smtClean="0"/>
-              <a:t>9/10/2018</a:t>
+              <a:t>9/21/2018</a:t>
             </a:fld>
             <a:endParaRPr lang="en-US"/>
           </a:p>
@@ -2411,7 +2413,7 @@
           <a:p>
             <a:fld id="{6BAEC7DB-416E-4648-AE31-15D6F0A9A9FB}" type="datetimeFigureOut">
               <a:rPr lang="en-US" smtClean="0"/>
-              <a:t>9/10/2018</a:t>
+              <a:t>9/21/2018</a:t>
             </a:fld>
             <a:endParaRPr lang="en-US"/>
           </a:p>
@@ -2700,7 +2702,7 @@
           <a:p>
             <a:fld id="{6BAEC7DB-416E-4648-AE31-15D6F0A9A9FB}" type="datetimeFigureOut">
               <a:rPr lang="en-US" smtClean="0"/>
-              <a:t>9/10/2018</a:t>
+              <a:t>9/21/2018</a:t>
             </a:fld>
             <a:endParaRPr lang="en-US"/>
           </a:p>
@@ -2943,7 +2945,7 @@
           <a:p>
             <a:fld id="{6BAEC7DB-416E-4648-AE31-15D6F0A9A9FB}" type="datetimeFigureOut">
               <a:rPr lang="en-US" smtClean="0"/>
-              <a:t>9/10/2018</a:t>
+              <a:t>9/21/2018</a:t>
             </a:fld>
             <a:endParaRPr lang="en-US"/>
           </a:p>
@@ -7439,6 +7441,4181 @@
 </p:sld>
 </file>
 
+<file path=ppt/slides/slide3.xml><?xml version="1.0" encoding="utf-8"?>
+<p:sld xmlns:a="http://schemas.openxmlformats.org/drawingml/2006/main" xmlns:r="http://schemas.openxmlformats.org/officeDocument/2006/relationships" xmlns:p="http://schemas.openxmlformats.org/presentationml/2006/main">
+  <p:cSld>
+    <p:spTree>
+      <p:nvGrpSpPr>
+        <p:cNvPr id="1" name=""/>
+        <p:cNvGrpSpPr/>
+        <p:nvPr/>
+      </p:nvGrpSpPr>
+      <p:grpSpPr>
+        <a:xfrm>
+          <a:off x="0" y="0"/>
+          <a:ext cx="0" cy="0"/>
+          <a:chOff x="0" y="0"/>
+          <a:chExt cx="0" cy="0"/>
+        </a:xfrm>
+      </p:grpSpPr>
+      <p:pic>
+        <p:nvPicPr>
+          <p:cNvPr id="4" name="图片 3">
+            <a:extLst>
+              <a:ext uri="{FF2B5EF4-FFF2-40B4-BE49-F238E27FC236}">
+                <a16:creationId xmlns:a16="http://schemas.microsoft.com/office/drawing/2014/main" id="{6B9188F1-10CD-4BB0-9C38-34AFDD7748F7}"/>
+              </a:ext>
+            </a:extLst>
+          </p:cNvPr>
+          <p:cNvPicPr>
+            <a:picLocks noChangeAspect="1"/>
+          </p:cNvPicPr>
+          <p:nvPr/>
+        </p:nvPicPr>
+        <p:blipFill>
+          <a:blip r:embed="rId2">
+            <a:extLst>
+              <a:ext uri="{28A0092B-C50C-407E-A947-70E740481C1C}">
+                <a14:useLocalDpi xmlns:a14="http://schemas.microsoft.com/office/drawing/2010/main" val="0"/>
+              </a:ext>
+            </a:extLst>
+          </a:blip>
+          <a:stretch>
+            <a:fillRect/>
+          </a:stretch>
+        </p:blipFill>
+        <p:spPr>
+          <a:xfrm>
+            <a:off x="2828327" y="74407"/>
+            <a:ext cx="6252110" cy="4689083"/>
+          </a:xfrm>
+          <a:prstGeom prst="rect">
+            <a:avLst/>
+          </a:prstGeom>
+        </p:spPr>
+      </p:pic>
+      <p:grpSp>
+        <p:nvGrpSpPr>
+          <p:cNvPr id="11" name="组合 10">
+            <a:extLst>
+              <a:ext uri="{FF2B5EF4-FFF2-40B4-BE49-F238E27FC236}">
+                <a16:creationId xmlns:a16="http://schemas.microsoft.com/office/drawing/2014/main" id="{76E6D201-F918-44D3-8CF0-36E3D4607571}"/>
+              </a:ext>
+            </a:extLst>
+          </p:cNvPr>
+          <p:cNvGrpSpPr/>
+          <p:nvPr/>
+        </p:nvGrpSpPr>
+        <p:grpSpPr>
+          <a:xfrm>
+            <a:off x="2432483" y="2140968"/>
+            <a:ext cx="1652148" cy="555959"/>
+            <a:chOff x="3248156" y="1872948"/>
+            <a:chExt cx="1504697" cy="701217"/>
+          </a:xfrm>
+        </p:grpSpPr>
+        <p:cxnSp>
+          <p:nvCxnSpPr>
+            <p:cNvPr id="59" name="直接连接符 58">
+              <a:extLst>
+                <a:ext uri="{FF2B5EF4-FFF2-40B4-BE49-F238E27FC236}">
+                  <a16:creationId xmlns:a16="http://schemas.microsoft.com/office/drawing/2014/main" id="{554D8D14-D48D-45F6-89A6-634C964B8AE8}"/>
+                </a:ext>
+              </a:extLst>
+            </p:cNvPr>
+            <p:cNvCxnSpPr>
+              <a:cxnSpLocks/>
+            </p:cNvCxnSpPr>
+            <p:nvPr/>
+          </p:nvCxnSpPr>
+          <p:spPr>
+            <a:xfrm>
+              <a:off x="3655573" y="1872948"/>
+              <a:ext cx="1097280" cy="0"/>
+            </a:xfrm>
+            <a:prstGeom prst="line">
+              <a:avLst/>
+            </a:prstGeom>
+            <a:ln w="9525" cap="flat" cmpd="sng" algn="ctr">
+              <a:solidFill>
+                <a:schemeClr val="accent3"/>
+              </a:solidFill>
+              <a:prstDash val="dash"/>
+              <a:round/>
+              <a:headEnd type="none" w="med" len="med"/>
+              <a:tailEnd type="none" w="med" len="med"/>
+            </a:ln>
+          </p:spPr>
+          <p:style>
+            <a:lnRef idx="0">
+              <a:scrgbClr r="0" g="0" b="0"/>
+            </a:lnRef>
+            <a:fillRef idx="0">
+              <a:scrgbClr r="0" g="0" b="0"/>
+            </a:fillRef>
+            <a:effectRef idx="0">
+              <a:scrgbClr r="0" g="0" b="0"/>
+            </a:effectRef>
+            <a:fontRef idx="minor">
+              <a:schemeClr val="tx1"/>
+            </a:fontRef>
+          </p:style>
+        </p:cxnSp>
+        <p:cxnSp>
+          <p:nvCxnSpPr>
+            <p:cNvPr id="62" name="直接连接符 61">
+              <a:extLst>
+                <a:ext uri="{FF2B5EF4-FFF2-40B4-BE49-F238E27FC236}">
+                  <a16:creationId xmlns:a16="http://schemas.microsoft.com/office/drawing/2014/main" id="{71513585-2402-4773-B202-B5A94B9B4E68}"/>
+                </a:ext>
+              </a:extLst>
+            </p:cNvPr>
+            <p:cNvCxnSpPr>
+              <a:cxnSpLocks/>
+            </p:cNvCxnSpPr>
+            <p:nvPr/>
+          </p:nvCxnSpPr>
+          <p:spPr>
+            <a:xfrm>
+              <a:off x="3655573" y="2574165"/>
+              <a:ext cx="1097280" cy="0"/>
+            </a:xfrm>
+            <a:prstGeom prst="line">
+              <a:avLst/>
+            </a:prstGeom>
+            <a:ln w="9525" cap="flat" cmpd="sng" algn="ctr">
+              <a:solidFill>
+                <a:schemeClr val="accent3"/>
+              </a:solidFill>
+              <a:prstDash val="dash"/>
+              <a:round/>
+              <a:headEnd type="none" w="med" len="med"/>
+              <a:tailEnd type="none" w="med" len="med"/>
+            </a:ln>
+          </p:spPr>
+          <p:style>
+            <a:lnRef idx="0">
+              <a:scrgbClr r="0" g="0" b="0"/>
+            </a:lnRef>
+            <a:fillRef idx="0">
+              <a:scrgbClr r="0" g="0" b="0"/>
+            </a:fillRef>
+            <a:effectRef idx="0">
+              <a:scrgbClr r="0" g="0" b="0"/>
+            </a:effectRef>
+            <a:fontRef idx="minor">
+              <a:schemeClr val="tx1"/>
+            </a:fontRef>
+          </p:style>
+        </p:cxnSp>
+        <p:cxnSp>
+          <p:nvCxnSpPr>
+            <p:cNvPr id="64" name="直接连接符 63">
+              <a:extLst>
+                <a:ext uri="{FF2B5EF4-FFF2-40B4-BE49-F238E27FC236}">
+                  <a16:creationId xmlns:a16="http://schemas.microsoft.com/office/drawing/2014/main" id="{F11B205F-0707-4A55-ACA4-3B1022C2AD5E}"/>
+                </a:ext>
+              </a:extLst>
+            </p:cNvPr>
+            <p:cNvCxnSpPr>
+              <a:cxnSpLocks/>
+            </p:cNvCxnSpPr>
+            <p:nvPr/>
+          </p:nvCxnSpPr>
+          <p:spPr>
+            <a:xfrm flipV="1">
+              <a:off x="3248156" y="2343059"/>
+              <a:ext cx="1463040" cy="0"/>
+            </a:xfrm>
+            <a:prstGeom prst="line">
+              <a:avLst/>
+            </a:prstGeom>
+            <a:ln w="9525" cap="flat" cmpd="sng" algn="ctr">
+              <a:solidFill>
+                <a:schemeClr val="accent3"/>
+              </a:solidFill>
+              <a:prstDash val="dash"/>
+              <a:round/>
+              <a:headEnd type="none" w="med" len="med"/>
+              <a:tailEnd type="none" w="med" len="med"/>
+            </a:ln>
+          </p:spPr>
+          <p:style>
+            <a:lnRef idx="0">
+              <a:scrgbClr r="0" g="0" b="0"/>
+            </a:lnRef>
+            <a:fillRef idx="0">
+              <a:scrgbClr r="0" g="0" b="0"/>
+            </a:fillRef>
+            <a:effectRef idx="0">
+              <a:scrgbClr r="0" g="0" b="0"/>
+            </a:effectRef>
+            <a:fontRef idx="minor">
+              <a:schemeClr val="tx1"/>
+            </a:fontRef>
+          </p:style>
+        </p:cxnSp>
+        <p:cxnSp>
+          <p:nvCxnSpPr>
+            <p:cNvPr id="69" name="直接连接符 68">
+              <a:extLst>
+                <a:ext uri="{FF2B5EF4-FFF2-40B4-BE49-F238E27FC236}">
+                  <a16:creationId xmlns:a16="http://schemas.microsoft.com/office/drawing/2014/main" id="{C23963EC-181B-4C8C-91B5-30994438B94F}"/>
+                </a:ext>
+              </a:extLst>
+            </p:cNvPr>
+            <p:cNvCxnSpPr>
+              <a:cxnSpLocks/>
+            </p:cNvCxnSpPr>
+            <p:nvPr/>
+          </p:nvCxnSpPr>
+          <p:spPr>
+            <a:xfrm>
+              <a:off x="3253632" y="2101314"/>
+              <a:ext cx="1463040" cy="0"/>
+            </a:xfrm>
+            <a:prstGeom prst="line">
+              <a:avLst/>
+            </a:prstGeom>
+            <a:ln w="9525" cap="flat" cmpd="sng" algn="ctr">
+              <a:solidFill>
+                <a:schemeClr val="accent3"/>
+              </a:solidFill>
+              <a:prstDash val="dash"/>
+              <a:round/>
+              <a:headEnd type="none" w="med" len="med"/>
+              <a:tailEnd type="none" w="med" len="med"/>
+            </a:ln>
+          </p:spPr>
+          <p:style>
+            <a:lnRef idx="0">
+              <a:scrgbClr r="0" g="0" b="0"/>
+            </a:lnRef>
+            <a:fillRef idx="0">
+              <a:scrgbClr r="0" g="0" b="0"/>
+            </a:fillRef>
+            <a:effectRef idx="0">
+              <a:scrgbClr r="0" g="0" b="0"/>
+            </a:effectRef>
+            <a:fontRef idx="minor">
+              <a:schemeClr val="tx1"/>
+            </a:fontRef>
+          </p:style>
+        </p:cxnSp>
+      </p:grpSp>
+      <p:cxnSp>
+        <p:nvCxnSpPr>
+          <p:cNvPr id="83" name="直接连接符 82">
+            <a:extLst>
+              <a:ext uri="{FF2B5EF4-FFF2-40B4-BE49-F238E27FC236}">
+                <a16:creationId xmlns:a16="http://schemas.microsoft.com/office/drawing/2014/main" id="{2B1DA2A3-4ED3-4440-94B7-BBD22FB36479}"/>
+              </a:ext>
+            </a:extLst>
+          </p:cNvPr>
+          <p:cNvCxnSpPr>
+            <a:cxnSpLocks/>
+            <a:endCxn id="24" idx="3"/>
+          </p:cNvCxnSpPr>
+          <p:nvPr/>
+        </p:nvCxnSpPr>
+        <p:spPr>
+          <a:xfrm flipH="1" flipV="1">
+            <a:off x="2428434" y="1713860"/>
+            <a:ext cx="451390" cy="414132"/>
+          </a:xfrm>
+          <a:prstGeom prst="line">
+            <a:avLst/>
+          </a:prstGeom>
+          <a:ln w="9525" cap="flat" cmpd="sng" algn="ctr">
+            <a:solidFill>
+              <a:schemeClr val="accent3"/>
+            </a:solidFill>
+            <a:prstDash val="dash"/>
+            <a:round/>
+            <a:headEnd type="none" w="med" len="med"/>
+            <a:tailEnd type="none" w="med" len="med"/>
+          </a:ln>
+        </p:spPr>
+        <p:style>
+          <a:lnRef idx="0">
+            <a:scrgbClr r="0" g="0" b="0"/>
+          </a:lnRef>
+          <a:fillRef idx="0">
+            <a:scrgbClr r="0" g="0" b="0"/>
+          </a:fillRef>
+          <a:effectRef idx="0">
+            <a:scrgbClr r="0" g="0" b="0"/>
+          </a:effectRef>
+          <a:fontRef idx="minor">
+            <a:schemeClr val="tx1"/>
+          </a:fontRef>
+        </p:style>
+      </p:cxnSp>
+      <p:cxnSp>
+        <p:nvCxnSpPr>
+          <p:cNvPr id="86" name="直接连接符 85">
+            <a:extLst>
+              <a:ext uri="{FF2B5EF4-FFF2-40B4-BE49-F238E27FC236}">
+                <a16:creationId xmlns:a16="http://schemas.microsoft.com/office/drawing/2014/main" id="{1DDB23F1-BC13-4F76-9BE4-AB93E1600A98}"/>
+              </a:ext>
+            </a:extLst>
+          </p:cNvPr>
+          <p:cNvCxnSpPr>
+            <a:cxnSpLocks/>
+            <a:endCxn id="29" idx="3"/>
+          </p:cNvCxnSpPr>
+          <p:nvPr/>
+        </p:nvCxnSpPr>
+        <p:spPr>
+          <a:xfrm flipH="1">
+            <a:off x="2428434" y="2696927"/>
+            <a:ext cx="449614" cy="427109"/>
+          </a:xfrm>
+          <a:prstGeom prst="line">
+            <a:avLst/>
+          </a:prstGeom>
+          <a:ln w="9525" cap="flat" cmpd="sng" algn="ctr">
+            <a:solidFill>
+              <a:schemeClr val="accent3"/>
+            </a:solidFill>
+            <a:prstDash val="dash"/>
+            <a:round/>
+            <a:headEnd type="none" w="med" len="med"/>
+            <a:tailEnd type="none" w="med" len="med"/>
+          </a:ln>
+        </p:spPr>
+        <p:style>
+          <a:lnRef idx="0">
+            <a:scrgbClr r="0" g="0" b="0"/>
+          </a:lnRef>
+          <a:fillRef idx="0">
+            <a:scrgbClr r="0" g="0" b="0"/>
+          </a:fillRef>
+          <a:effectRef idx="0">
+            <a:scrgbClr r="0" g="0" b="0"/>
+          </a:effectRef>
+          <a:fontRef idx="minor">
+            <a:schemeClr val="tx1"/>
+          </a:fontRef>
+        </p:style>
+      </p:cxnSp>
+      <p:sp>
+        <p:nvSpPr>
+          <p:cNvPr id="5" name="文本框 4">
+            <a:extLst>
+              <a:ext uri="{FF2B5EF4-FFF2-40B4-BE49-F238E27FC236}">
+                <a16:creationId xmlns:a16="http://schemas.microsoft.com/office/drawing/2014/main" id="{D01C0A0C-C039-423C-A515-A9BDBADCF5E6}"/>
+              </a:ext>
+            </a:extLst>
+          </p:cNvPr>
+          <p:cNvSpPr txBox="1"/>
+          <p:nvPr/>
+        </p:nvSpPr>
+        <p:spPr>
+          <a:xfrm>
+            <a:off x="4183684" y="4446089"/>
+            <a:ext cx="6347976" cy="2021066"/>
+          </a:xfrm>
+          <a:prstGeom prst="rect">
+            <a:avLst/>
+          </a:prstGeom>
+          <a:noFill/>
+        </p:spPr>
+        <p:txBody>
+          <a:bodyPr wrap="square" rtlCol="0">
+            <a:spAutoFit/>
+          </a:bodyPr>
+          <a:lstStyle/>
+          <a:p>
+            <a:pPr>
+              <a:lnSpc>
+                <a:spcPts val="2500"/>
+              </a:lnSpc>
+            </a:pPr>
+            <a:r>
+              <a:rPr lang="en-US" sz="1600">
+                <a:latin typeface="Leelawadee UI" panose="020B0502040204020203" pitchFamily="34" charset="-34"/>
+                <a:ea typeface="Microsoft JhengHei Light" panose="020B0304030504040204" pitchFamily="34" charset="-120"/>
+                <a:cs typeface="Leelawadee UI" panose="020B0502040204020203" pitchFamily="34" charset="-34"/>
+              </a:rPr>
+              <a:t>GND: </a:t>
+            </a:r>
+            <a:r>
+              <a:rPr lang="zh-CN" altLang="en-US" sz="1600">
+                <a:latin typeface="华文楷体" panose="02010600040101010101" pitchFamily="2" charset="-122"/>
+                <a:ea typeface="华文楷体" panose="02010600040101010101" pitchFamily="2" charset="-122"/>
+                <a:cs typeface="Leelawadee UI" panose="020B0502040204020203" pitchFamily="34" charset="-34"/>
+              </a:rPr>
+              <a:t>将模块连接至系统上</a:t>
+            </a:r>
+            <a:endParaRPr lang="en-US" sz="1600">
+              <a:latin typeface="华文楷体" panose="02010600040101010101" pitchFamily="2" charset="-122"/>
+              <a:ea typeface="华文楷体" panose="02010600040101010101" pitchFamily="2" charset="-122"/>
+              <a:cs typeface="Leelawadee UI" panose="020B0502040204020203" pitchFamily="34" charset="-34"/>
+            </a:endParaRPr>
+          </a:p>
+          <a:p>
+            <a:pPr>
+              <a:lnSpc>
+                <a:spcPts val="2500"/>
+              </a:lnSpc>
+            </a:pPr>
+            <a:r>
+              <a:rPr lang="en-US" sz="1600">
+                <a:latin typeface="Leelawadee UI" panose="020B0502040204020203" pitchFamily="34" charset="-34"/>
+                <a:ea typeface="Microsoft JhengHei Light" panose="020B0304030504040204" pitchFamily="34" charset="-120"/>
+                <a:cs typeface="Leelawadee UI" panose="020B0502040204020203" pitchFamily="34" charset="-34"/>
+              </a:rPr>
+              <a:t>VCC: </a:t>
+            </a:r>
+            <a:r>
+              <a:rPr lang="zh-CN" altLang="en-US" sz="1600">
+                <a:latin typeface="华文楷体" panose="02010600040101010101" pitchFamily="2" charset="-122"/>
+                <a:ea typeface="华文楷体" panose="02010600040101010101" pitchFamily="2" charset="-122"/>
+                <a:cs typeface="Leelawadee UI" panose="020B0502040204020203" pitchFamily="34" charset="-34"/>
+              </a:rPr>
+              <a:t>在此模块中，您可以设置</a:t>
+            </a:r>
+            <a:r>
+              <a:rPr lang="en-US" sz="1600">
+                <a:latin typeface="华文楷体" panose="02010600040101010101" pitchFamily="2" charset="-122"/>
+                <a:ea typeface="华文楷体" panose="02010600040101010101" pitchFamily="2" charset="-122"/>
+                <a:cs typeface="Leelawadee UI" panose="020B0502040204020203" pitchFamily="34" charset="-34"/>
+              </a:rPr>
+              <a:t> 5V </a:t>
+            </a:r>
+            <a:r>
+              <a:rPr lang="zh-CN" altLang="en-US" sz="1600">
+                <a:latin typeface="华文楷体" panose="02010600040101010101" pitchFamily="2" charset="-122"/>
+                <a:ea typeface="华文楷体" panose="02010600040101010101" pitchFamily="2" charset="-122"/>
+                <a:cs typeface="Leelawadee UI" panose="020B0502040204020203" pitchFamily="34" charset="-34"/>
+              </a:rPr>
+              <a:t>或</a:t>
+            </a:r>
+            <a:r>
+              <a:rPr lang="en-US" sz="1600">
+                <a:latin typeface="华文楷体" panose="02010600040101010101" pitchFamily="2" charset="-122"/>
+                <a:ea typeface="华文楷体" panose="02010600040101010101" pitchFamily="2" charset="-122"/>
+                <a:cs typeface="Leelawadee UI" panose="020B0502040204020203" pitchFamily="34" charset="-34"/>
+              </a:rPr>
+              <a:t> 3.3V </a:t>
+            </a:r>
+            <a:r>
+              <a:rPr lang="zh-CN" altLang="en-US" sz="1600">
+                <a:latin typeface="华文楷体" panose="02010600040101010101" pitchFamily="2" charset="-122"/>
+                <a:ea typeface="华文楷体" panose="02010600040101010101" pitchFamily="2" charset="-122"/>
+                <a:cs typeface="Leelawadee UI" panose="020B0502040204020203" pitchFamily="34" charset="-34"/>
+              </a:rPr>
+              <a:t>电压</a:t>
+            </a:r>
+            <a:endParaRPr lang="en-US" sz="1600">
+              <a:latin typeface="华文楷体" panose="02010600040101010101" pitchFamily="2" charset="-122"/>
+              <a:ea typeface="华文楷体" panose="02010600040101010101" pitchFamily="2" charset="-122"/>
+              <a:cs typeface="Leelawadee UI" panose="020B0502040204020203" pitchFamily="34" charset="-34"/>
+            </a:endParaRPr>
+          </a:p>
+          <a:p>
+            <a:pPr>
+              <a:lnSpc>
+                <a:spcPts val="2500"/>
+              </a:lnSpc>
+            </a:pPr>
+            <a:r>
+              <a:rPr lang="en-US" sz="1600">
+                <a:latin typeface="Leelawadee UI" panose="020B0502040204020203" pitchFamily="34" charset="-34"/>
+                <a:ea typeface="Microsoft JhengHei Light" panose="020B0304030504040204" pitchFamily="34" charset="-120"/>
+                <a:cs typeface="Leelawadee UI" panose="020B0502040204020203" pitchFamily="34" charset="-34"/>
+              </a:rPr>
+              <a:t>SDA: I</a:t>
+            </a:r>
+            <a:r>
+              <a:rPr lang="en-US" sz="1600" baseline="30000">
+                <a:latin typeface="Leelawadee UI" panose="020B0502040204020203" pitchFamily="34" charset="-34"/>
+                <a:ea typeface="Microsoft JhengHei Light" panose="020B0304030504040204" pitchFamily="34" charset="-120"/>
+                <a:cs typeface="Leelawadee UI" panose="020B0502040204020203" pitchFamily="34" charset="-34"/>
+              </a:rPr>
+              <a:t>2</a:t>
+            </a:r>
+            <a:r>
+              <a:rPr lang="en-US" sz="1600">
+                <a:latin typeface="Leelawadee UI" panose="020B0502040204020203" pitchFamily="34" charset="-34"/>
+                <a:ea typeface="Microsoft JhengHei Light" panose="020B0304030504040204" pitchFamily="34" charset="-120"/>
+                <a:cs typeface="Leelawadee UI" panose="020B0502040204020203" pitchFamily="34" charset="-34"/>
+              </a:rPr>
+              <a:t>C </a:t>
+            </a:r>
+            <a:r>
+              <a:rPr lang="zh-CN" altLang="en-US" sz="1600">
+                <a:latin typeface="华文楷体" panose="02010600040101010101" pitchFamily="2" charset="-122"/>
+                <a:ea typeface="华文楷体" panose="02010600040101010101" pitchFamily="2" charset="-122"/>
+                <a:cs typeface="Leelawadee UI" panose="020B0502040204020203" pitchFamily="34" charset="-34"/>
+              </a:rPr>
+              <a:t>数据线</a:t>
+            </a:r>
+            <a:endParaRPr lang="en-US" altLang="zh-CN" sz="1600">
+              <a:latin typeface="华文楷体" panose="02010600040101010101" pitchFamily="2" charset="-122"/>
+              <a:ea typeface="华文楷体" panose="02010600040101010101" pitchFamily="2" charset="-122"/>
+              <a:cs typeface="Leelawadee UI" panose="020B0502040204020203" pitchFamily="34" charset="-34"/>
+            </a:endParaRPr>
+          </a:p>
+          <a:p>
+            <a:pPr>
+              <a:lnSpc>
+                <a:spcPts val="2500"/>
+              </a:lnSpc>
+            </a:pPr>
+            <a:r>
+              <a:rPr lang="en-US" sz="1600">
+                <a:latin typeface="Leelawadee UI" panose="020B0502040204020203" pitchFamily="34" charset="-34"/>
+                <a:ea typeface="Microsoft JhengHei Light" panose="020B0304030504040204" pitchFamily="34" charset="-120"/>
+                <a:cs typeface="Leelawadee UI" panose="020B0502040204020203" pitchFamily="34" charset="-34"/>
+              </a:rPr>
+              <a:t>SCL: I</a:t>
+            </a:r>
+            <a:r>
+              <a:rPr lang="en-US" sz="1600" baseline="30000">
+                <a:latin typeface="Leelawadee UI" panose="020B0502040204020203" pitchFamily="34" charset="-34"/>
+                <a:ea typeface="Microsoft JhengHei Light" panose="020B0304030504040204" pitchFamily="34" charset="-120"/>
+                <a:cs typeface="Leelawadee UI" panose="020B0502040204020203" pitchFamily="34" charset="-34"/>
+              </a:rPr>
+              <a:t>2</a:t>
+            </a:r>
+            <a:r>
+              <a:rPr lang="en-US" sz="1600">
+                <a:latin typeface="Leelawadee UI" panose="020B0502040204020203" pitchFamily="34" charset="-34"/>
+                <a:ea typeface="Microsoft JhengHei Light" panose="020B0304030504040204" pitchFamily="34" charset="-120"/>
+                <a:cs typeface="Leelawadee UI" panose="020B0502040204020203" pitchFamily="34" charset="-34"/>
+              </a:rPr>
+              <a:t>C </a:t>
+            </a:r>
+            <a:r>
+              <a:rPr lang="zh-CN" altLang="en-US" sz="1600">
+                <a:latin typeface="华文楷体" panose="02010600040101010101" pitchFamily="2" charset="-122"/>
+                <a:ea typeface="华文楷体" panose="02010600040101010101" pitchFamily="2" charset="-122"/>
+                <a:cs typeface="Leelawadee UI" panose="020B0502040204020203" pitchFamily="34" charset="-34"/>
+              </a:rPr>
+              <a:t>时钟线</a:t>
+            </a:r>
+            <a:endParaRPr lang="en-US" sz="1200">
+              <a:solidFill>
+                <a:srgbClr val="D4D4D4"/>
+              </a:solidFill>
+              <a:latin typeface="华文楷体" panose="02010600040101010101" pitchFamily="2" charset="-122"/>
+              <a:ea typeface="华文楷体" panose="02010600040101010101" pitchFamily="2" charset="-122"/>
+            </a:endParaRPr>
+          </a:p>
+          <a:p>
+            <a:endParaRPr lang="en-US" sz="1200">
+              <a:latin typeface="Times New Roman" panose="02020603050405020304" pitchFamily="18" charset="0"/>
+              <a:cs typeface="Times New Roman" panose="02020603050405020304" pitchFamily="18" charset="0"/>
+            </a:endParaRPr>
+          </a:p>
+          <a:p>
+            <a:endParaRPr lang="en-US" sz="1200">
+              <a:latin typeface="Times New Roman" panose="02020603050405020304" pitchFamily="18" charset="0"/>
+              <a:cs typeface="Times New Roman" panose="02020603050405020304" pitchFamily="18" charset="0"/>
+            </a:endParaRPr>
+          </a:p>
+          <a:p>
+            <a:endParaRPr lang="en-US"/>
+          </a:p>
+        </p:txBody>
+      </p:sp>
+      <p:grpSp>
+        <p:nvGrpSpPr>
+          <p:cNvPr id="22" name="组合 21">
+            <a:extLst>
+              <a:ext uri="{FF2B5EF4-FFF2-40B4-BE49-F238E27FC236}">
+                <a16:creationId xmlns:a16="http://schemas.microsoft.com/office/drawing/2014/main" id="{E7D4E32D-8E31-44A0-A677-EF1FE20A81F9}"/>
+              </a:ext>
+            </a:extLst>
+          </p:cNvPr>
+          <p:cNvGrpSpPr/>
+          <p:nvPr/>
+        </p:nvGrpSpPr>
+        <p:grpSpPr>
+          <a:xfrm>
+            <a:off x="1952184" y="1475735"/>
+            <a:ext cx="476250" cy="1886426"/>
+            <a:chOff x="2261625" y="1357253"/>
+            <a:chExt cx="476250" cy="1886426"/>
+          </a:xfrm>
+        </p:grpSpPr>
+        <p:pic>
+          <p:nvPicPr>
+            <p:cNvPr id="23" name="图片 22">
+              <a:extLst>
+                <a:ext uri="{FF2B5EF4-FFF2-40B4-BE49-F238E27FC236}">
+                  <a16:creationId xmlns:a16="http://schemas.microsoft.com/office/drawing/2014/main" id="{2725DBFD-9386-4099-AD05-B68C0B14B4A0}"/>
+                </a:ext>
+              </a:extLst>
+            </p:cNvPr>
+            <p:cNvPicPr>
+              <a:picLocks noChangeAspect="1"/>
+            </p:cNvPicPr>
+            <p:nvPr/>
+          </p:nvPicPr>
+          <p:blipFill>
+            <a:blip r:embed="rId3">
+              <a:extLst>
+                <a:ext uri="{28A0092B-C50C-407E-A947-70E740481C1C}">
+                  <a14:useLocalDpi xmlns:a14="http://schemas.microsoft.com/office/drawing/2010/main" val="0"/>
+                </a:ext>
+              </a:extLst>
+            </a:blip>
+            <a:stretch>
+              <a:fillRect/>
+            </a:stretch>
+          </p:blipFill>
+          <p:spPr>
+            <a:xfrm>
+              <a:off x="2261625" y="1827312"/>
+              <a:ext cx="476250" cy="476250"/>
+            </a:xfrm>
+            <a:prstGeom prst="rect">
+              <a:avLst/>
+            </a:prstGeom>
+          </p:spPr>
+        </p:pic>
+        <p:pic>
+          <p:nvPicPr>
+            <p:cNvPr id="24" name="图片 23">
+              <a:extLst>
+                <a:ext uri="{FF2B5EF4-FFF2-40B4-BE49-F238E27FC236}">
+                  <a16:creationId xmlns:a16="http://schemas.microsoft.com/office/drawing/2014/main" id="{94ED9535-D1C1-42FA-930D-676D411F2B17}"/>
+                </a:ext>
+              </a:extLst>
+            </p:cNvPr>
+            <p:cNvPicPr>
+              <a:picLocks noChangeAspect="1"/>
+            </p:cNvPicPr>
+            <p:nvPr/>
+          </p:nvPicPr>
+          <p:blipFill>
+            <a:blip r:embed="rId4">
+              <a:extLst>
+                <a:ext uri="{28A0092B-C50C-407E-A947-70E740481C1C}">
+                  <a14:useLocalDpi xmlns:a14="http://schemas.microsoft.com/office/drawing/2010/main" val="0"/>
+                </a:ext>
+              </a:extLst>
+            </a:blip>
+            <a:stretch>
+              <a:fillRect/>
+            </a:stretch>
+          </p:blipFill>
+          <p:spPr>
+            <a:xfrm>
+              <a:off x="2261625" y="1357253"/>
+              <a:ext cx="476250" cy="476250"/>
+            </a:xfrm>
+            <a:prstGeom prst="rect">
+              <a:avLst/>
+            </a:prstGeom>
+          </p:spPr>
+        </p:pic>
+        <p:pic>
+          <p:nvPicPr>
+            <p:cNvPr id="29" name="图片 28">
+              <a:extLst>
+                <a:ext uri="{FF2B5EF4-FFF2-40B4-BE49-F238E27FC236}">
+                  <a16:creationId xmlns:a16="http://schemas.microsoft.com/office/drawing/2014/main" id="{E1B15D79-0094-4D8C-9AD8-1B1D8C9B6F3C}"/>
+                </a:ext>
+              </a:extLst>
+            </p:cNvPr>
+            <p:cNvPicPr>
+              <a:picLocks noChangeAspect="1"/>
+            </p:cNvPicPr>
+            <p:nvPr/>
+          </p:nvPicPr>
+          <p:blipFill>
+            <a:blip r:embed="rId5">
+              <a:extLst>
+                <a:ext uri="{28A0092B-C50C-407E-A947-70E740481C1C}">
+                  <a14:useLocalDpi xmlns:a14="http://schemas.microsoft.com/office/drawing/2010/main" val="0"/>
+                </a:ext>
+              </a:extLst>
+            </a:blip>
+            <a:stretch>
+              <a:fillRect/>
+            </a:stretch>
+          </p:blipFill>
+          <p:spPr>
+            <a:xfrm>
+              <a:off x="2261625" y="2767429"/>
+              <a:ext cx="476250" cy="476250"/>
+            </a:xfrm>
+            <a:prstGeom prst="rect">
+              <a:avLst/>
+            </a:prstGeom>
+          </p:spPr>
+        </p:pic>
+        <p:pic>
+          <p:nvPicPr>
+            <p:cNvPr id="30" name="图片 29">
+              <a:extLst>
+                <a:ext uri="{FF2B5EF4-FFF2-40B4-BE49-F238E27FC236}">
+                  <a16:creationId xmlns:a16="http://schemas.microsoft.com/office/drawing/2014/main" id="{947E7C36-7CD4-49F4-93BD-C1136AED8B83}"/>
+                </a:ext>
+              </a:extLst>
+            </p:cNvPr>
+            <p:cNvPicPr>
+              <a:picLocks noChangeAspect="1"/>
+            </p:cNvPicPr>
+            <p:nvPr/>
+          </p:nvPicPr>
+          <p:blipFill>
+            <a:blip r:embed="rId6">
+              <a:extLst>
+                <a:ext uri="{28A0092B-C50C-407E-A947-70E740481C1C}">
+                  <a14:useLocalDpi xmlns:a14="http://schemas.microsoft.com/office/drawing/2010/main" val="0"/>
+                </a:ext>
+              </a:extLst>
+            </a:blip>
+            <a:stretch>
+              <a:fillRect/>
+            </a:stretch>
+          </p:blipFill>
+          <p:spPr>
+            <a:xfrm>
+              <a:off x="2261625" y="2297371"/>
+              <a:ext cx="476250" cy="476250"/>
+            </a:xfrm>
+            <a:prstGeom prst="rect">
+              <a:avLst/>
+            </a:prstGeom>
+          </p:spPr>
+        </p:pic>
+      </p:grpSp>
+      <p:grpSp>
+        <p:nvGrpSpPr>
+          <p:cNvPr id="3" name="组合 2">
+            <a:extLst>
+              <a:ext uri="{FF2B5EF4-FFF2-40B4-BE49-F238E27FC236}">
+                <a16:creationId xmlns:a16="http://schemas.microsoft.com/office/drawing/2014/main" id="{4A87C5E1-6289-4842-BE3C-66033B403B1E}"/>
+              </a:ext>
+            </a:extLst>
+          </p:cNvPr>
+          <p:cNvGrpSpPr/>
+          <p:nvPr/>
+        </p:nvGrpSpPr>
+        <p:grpSpPr>
+          <a:xfrm>
+            <a:off x="3952654" y="4517881"/>
+            <a:ext cx="266700" cy="1217219"/>
+            <a:chOff x="6884220" y="1641910"/>
+            <a:chExt cx="266700" cy="1217219"/>
+          </a:xfrm>
+        </p:grpSpPr>
+        <p:pic>
+          <p:nvPicPr>
+            <p:cNvPr id="41" name="图片 40">
+              <a:extLst>
+                <a:ext uri="{FF2B5EF4-FFF2-40B4-BE49-F238E27FC236}">
+                  <a16:creationId xmlns:a16="http://schemas.microsoft.com/office/drawing/2014/main" id="{CA9C3071-9603-40A9-8222-381D7D4E7FEB}"/>
+                </a:ext>
+              </a:extLst>
+            </p:cNvPr>
+            <p:cNvPicPr>
+              <a:picLocks noChangeAspect="1"/>
+            </p:cNvPicPr>
+            <p:nvPr/>
+          </p:nvPicPr>
+          <p:blipFill>
+            <a:blip r:embed="rId3">
+              <a:extLst>
+                <a:ext uri="{28A0092B-C50C-407E-A947-70E740481C1C}">
+                  <a14:useLocalDpi xmlns:a14="http://schemas.microsoft.com/office/drawing/2010/main" val="0"/>
+                </a:ext>
+              </a:extLst>
+            </a:blip>
+            <a:stretch>
+              <a:fillRect/>
+            </a:stretch>
+          </p:blipFill>
+          <p:spPr>
+            <a:xfrm>
+              <a:off x="6884220" y="1958750"/>
+              <a:ext cx="266700" cy="266700"/>
+            </a:xfrm>
+            <a:prstGeom prst="rect">
+              <a:avLst/>
+            </a:prstGeom>
+          </p:spPr>
+        </p:pic>
+        <p:pic>
+          <p:nvPicPr>
+            <p:cNvPr id="42" name="图片 41">
+              <a:extLst>
+                <a:ext uri="{FF2B5EF4-FFF2-40B4-BE49-F238E27FC236}">
+                  <a16:creationId xmlns:a16="http://schemas.microsoft.com/office/drawing/2014/main" id="{E6A2B3EE-279E-430C-8486-B5F9943BC5E2}"/>
+                </a:ext>
+              </a:extLst>
+            </p:cNvPr>
+            <p:cNvPicPr>
+              <a:picLocks noChangeAspect="1"/>
+            </p:cNvPicPr>
+            <p:nvPr/>
+          </p:nvPicPr>
+          <p:blipFill>
+            <a:blip r:embed="rId4">
+              <a:extLst>
+                <a:ext uri="{28A0092B-C50C-407E-A947-70E740481C1C}">
+                  <a14:useLocalDpi xmlns:a14="http://schemas.microsoft.com/office/drawing/2010/main" val="0"/>
+                </a:ext>
+              </a:extLst>
+            </a:blip>
+            <a:stretch>
+              <a:fillRect/>
+            </a:stretch>
+          </p:blipFill>
+          <p:spPr>
+            <a:xfrm>
+              <a:off x="6884220" y="1641910"/>
+              <a:ext cx="266700" cy="266700"/>
+            </a:xfrm>
+            <a:prstGeom prst="rect">
+              <a:avLst/>
+            </a:prstGeom>
+          </p:spPr>
+        </p:pic>
+        <p:pic>
+          <p:nvPicPr>
+            <p:cNvPr id="43" name="图片 42">
+              <a:extLst>
+                <a:ext uri="{FF2B5EF4-FFF2-40B4-BE49-F238E27FC236}">
+                  <a16:creationId xmlns:a16="http://schemas.microsoft.com/office/drawing/2014/main" id="{0ADC9064-80EA-4C1A-8C1A-38BEC1DDF0F3}"/>
+                </a:ext>
+              </a:extLst>
+            </p:cNvPr>
+            <p:cNvPicPr>
+              <a:picLocks noChangeAspect="1"/>
+            </p:cNvPicPr>
+            <p:nvPr/>
+          </p:nvPicPr>
+          <p:blipFill>
+            <a:blip r:embed="rId5">
+              <a:extLst>
+                <a:ext uri="{28A0092B-C50C-407E-A947-70E740481C1C}">
+                  <a14:useLocalDpi xmlns:a14="http://schemas.microsoft.com/office/drawing/2010/main" val="0"/>
+                </a:ext>
+              </a:extLst>
+            </a:blip>
+            <a:stretch>
+              <a:fillRect/>
+            </a:stretch>
+          </p:blipFill>
+          <p:spPr>
+            <a:xfrm>
+              <a:off x="6884220" y="2592429"/>
+              <a:ext cx="266700" cy="266700"/>
+            </a:xfrm>
+            <a:prstGeom prst="rect">
+              <a:avLst/>
+            </a:prstGeom>
+          </p:spPr>
+        </p:pic>
+        <p:pic>
+          <p:nvPicPr>
+            <p:cNvPr id="44" name="图片 43">
+              <a:extLst>
+                <a:ext uri="{FF2B5EF4-FFF2-40B4-BE49-F238E27FC236}">
+                  <a16:creationId xmlns:a16="http://schemas.microsoft.com/office/drawing/2014/main" id="{2002B381-D04D-4871-9F43-F79C8C9B30A5}"/>
+                </a:ext>
+              </a:extLst>
+            </p:cNvPr>
+            <p:cNvPicPr>
+              <a:picLocks noChangeAspect="1"/>
+            </p:cNvPicPr>
+            <p:nvPr/>
+          </p:nvPicPr>
+          <p:blipFill>
+            <a:blip r:embed="rId6">
+              <a:extLst>
+                <a:ext uri="{28A0092B-C50C-407E-A947-70E740481C1C}">
+                  <a14:useLocalDpi xmlns:a14="http://schemas.microsoft.com/office/drawing/2010/main" val="0"/>
+                </a:ext>
+              </a:extLst>
+            </a:blip>
+            <a:stretch>
+              <a:fillRect/>
+            </a:stretch>
+          </p:blipFill>
+          <p:spPr>
+            <a:xfrm>
+              <a:off x="6884220" y="2275589"/>
+              <a:ext cx="266700" cy="266700"/>
+            </a:xfrm>
+            <a:prstGeom prst="rect">
+              <a:avLst/>
+            </a:prstGeom>
+          </p:spPr>
+        </p:pic>
+      </p:grpSp>
+      <p:sp>
+        <p:nvSpPr>
+          <p:cNvPr id="67" name="椭圆 66">
+            <a:extLst>
+              <a:ext uri="{FF2B5EF4-FFF2-40B4-BE49-F238E27FC236}">
+                <a16:creationId xmlns:a16="http://schemas.microsoft.com/office/drawing/2014/main" id="{F250AFB1-55CB-41D8-8B3E-B8E7F5160487}"/>
+              </a:ext>
+            </a:extLst>
+          </p:cNvPr>
+          <p:cNvSpPr>
+            <a:spLocks noChangeAspect="1"/>
+          </p:cNvSpPr>
+          <p:nvPr/>
+        </p:nvSpPr>
+        <p:spPr>
+          <a:xfrm>
+            <a:off x="8423657" y="1962738"/>
+            <a:ext cx="103124" cy="103124"/>
+          </a:xfrm>
+          <a:prstGeom prst="ellipse">
+            <a:avLst/>
+          </a:prstGeom>
+          <a:solidFill>
+            <a:srgbClr val="FFC000"/>
+          </a:solidFill>
+          <a:ln>
+            <a:solidFill>
+              <a:srgbClr val="FFC000"/>
+            </a:solidFill>
+          </a:ln>
+        </p:spPr>
+        <p:style>
+          <a:lnRef idx="2">
+            <a:schemeClr val="accent1">
+              <a:shade val="50000"/>
+            </a:schemeClr>
+          </a:lnRef>
+          <a:fillRef idx="1">
+            <a:schemeClr val="accent1"/>
+          </a:fillRef>
+          <a:effectRef idx="0">
+            <a:schemeClr val="accent1"/>
+          </a:effectRef>
+          <a:fontRef idx="minor">
+            <a:schemeClr val="lt1"/>
+          </a:fontRef>
+        </p:style>
+        <p:txBody>
+          <a:bodyPr rtlCol="0" anchor="ctr"/>
+          <a:lstStyle/>
+          <a:p>
+            <a:pPr algn="ctr"/>
+            <a:endParaRPr lang="en-US"/>
+          </a:p>
+        </p:txBody>
+      </p:sp>
+      <p:grpSp>
+        <p:nvGrpSpPr>
+          <p:cNvPr id="14" name="组合 13">
+            <a:extLst>
+              <a:ext uri="{FF2B5EF4-FFF2-40B4-BE49-F238E27FC236}">
+                <a16:creationId xmlns:a16="http://schemas.microsoft.com/office/drawing/2014/main" id="{3056D6A3-74C9-40AB-821F-44112FCC3312}"/>
+              </a:ext>
+            </a:extLst>
+          </p:cNvPr>
+          <p:cNvGrpSpPr/>
+          <p:nvPr/>
+        </p:nvGrpSpPr>
+        <p:grpSpPr>
+          <a:xfrm>
+            <a:off x="4350058" y="3028990"/>
+            <a:ext cx="3271622" cy="991252"/>
+            <a:chOff x="4350058" y="3028990"/>
+            <a:chExt cx="3271622" cy="991252"/>
+          </a:xfrm>
+        </p:grpSpPr>
+        <p:grpSp>
+          <p:nvGrpSpPr>
+            <p:cNvPr id="13" name="组合 12">
+              <a:extLst>
+                <a:ext uri="{FF2B5EF4-FFF2-40B4-BE49-F238E27FC236}">
+                  <a16:creationId xmlns:a16="http://schemas.microsoft.com/office/drawing/2014/main" id="{E01B567B-1820-4AE6-9186-8B34C18C7A43}"/>
+                </a:ext>
+              </a:extLst>
+            </p:cNvPr>
+            <p:cNvGrpSpPr/>
+            <p:nvPr/>
+          </p:nvGrpSpPr>
+          <p:grpSpPr>
+            <a:xfrm>
+              <a:off x="4350058" y="3028990"/>
+              <a:ext cx="612668" cy="991252"/>
+              <a:chOff x="4350058" y="3002356"/>
+              <a:chExt cx="612668" cy="991252"/>
+            </a:xfrm>
+          </p:grpSpPr>
+          <p:sp>
+            <p:nvSpPr>
+              <p:cNvPr id="9" name="文本框 8">
+                <a:extLst>
+                  <a:ext uri="{FF2B5EF4-FFF2-40B4-BE49-F238E27FC236}">
+                    <a16:creationId xmlns:a16="http://schemas.microsoft.com/office/drawing/2014/main" id="{AC98CD95-CF1C-458E-8115-A2293ED5828A}"/>
+                  </a:ext>
+                </a:extLst>
+              </p:cNvPr>
+              <p:cNvSpPr txBox="1"/>
+              <p:nvPr/>
+            </p:nvSpPr>
+            <p:spPr>
+              <a:xfrm>
+                <a:off x="4350058" y="3593498"/>
+                <a:ext cx="612668" cy="400110"/>
+              </a:xfrm>
+              <a:prstGeom prst="rect">
+                <a:avLst/>
+              </a:prstGeom>
+              <a:noFill/>
+            </p:spPr>
+            <p:txBody>
+              <a:bodyPr wrap="none" rtlCol="0">
+                <a:spAutoFit/>
+              </a:bodyPr>
+              <a:lstStyle/>
+              <a:p>
+                <a:r>
+                  <a:rPr lang="en-US" sz="2000" b="1">
+                    <a:solidFill>
+                      <a:schemeClr val="bg1">
+                        <a:lumMod val="50000"/>
+                      </a:schemeClr>
+                    </a:solidFill>
+                  </a:rPr>
+                  <a:t>CH0</a:t>
+                </a:r>
+              </a:p>
+            </p:txBody>
+          </p:sp>
+          <p:cxnSp>
+            <p:nvCxnSpPr>
+              <p:cNvPr id="12" name="直接连接符 11">
+                <a:extLst>
+                  <a:ext uri="{FF2B5EF4-FFF2-40B4-BE49-F238E27FC236}">
+                    <a16:creationId xmlns:a16="http://schemas.microsoft.com/office/drawing/2014/main" id="{4AE05063-A1B1-4B6C-99F8-17186548DD59}"/>
+                  </a:ext>
+                </a:extLst>
+              </p:cNvPr>
+              <p:cNvCxnSpPr>
+                <a:stCxn id="9" idx="0"/>
+              </p:cNvCxnSpPr>
+              <p:nvPr/>
+            </p:nvCxnSpPr>
+            <p:spPr>
+              <a:xfrm flipV="1">
+                <a:off x="4656392" y="3053918"/>
+                <a:ext cx="0" cy="539580"/>
+              </a:xfrm>
+              <a:prstGeom prst="line">
+                <a:avLst/>
+              </a:prstGeom>
+              <a:ln w="9525" cap="flat" cmpd="sng" algn="ctr">
+                <a:solidFill>
+                  <a:schemeClr val="accent3"/>
+                </a:solidFill>
+                <a:prstDash val="dash"/>
+                <a:round/>
+                <a:headEnd type="none" w="med" len="med"/>
+                <a:tailEnd type="none" w="med" len="med"/>
+              </a:ln>
+            </p:spPr>
+            <p:style>
+              <a:lnRef idx="0">
+                <a:scrgbClr r="0" g="0" b="0"/>
+              </a:lnRef>
+              <a:fillRef idx="0">
+                <a:scrgbClr r="0" g="0" b="0"/>
+              </a:fillRef>
+              <a:effectRef idx="0">
+                <a:scrgbClr r="0" g="0" b="0"/>
+              </a:effectRef>
+              <a:fontRef idx="minor">
+                <a:schemeClr val="tx1"/>
+              </a:fontRef>
+            </p:style>
+          </p:cxnSp>
+          <p:sp>
+            <p:nvSpPr>
+              <p:cNvPr id="56" name="椭圆 55">
+                <a:extLst>
+                  <a:ext uri="{FF2B5EF4-FFF2-40B4-BE49-F238E27FC236}">
+                    <a16:creationId xmlns:a16="http://schemas.microsoft.com/office/drawing/2014/main" id="{286852CA-5BC1-4B6C-9C83-6AADF75915AB}"/>
+                  </a:ext>
+                </a:extLst>
+              </p:cNvPr>
+              <p:cNvSpPr>
+                <a:spLocks noChangeAspect="1"/>
+              </p:cNvSpPr>
+              <p:nvPr/>
+            </p:nvSpPr>
+            <p:spPr>
+              <a:xfrm>
+                <a:off x="4604830" y="3002356"/>
+                <a:ext cx="103124" cy="103124"/>
+              </a:xfrm>
+              <a:prstGeom prst="ellipse">
+                <a:avLst/>
+              </a:prstGeom>
+              <a:solidFill>
+                <a:srgbClr val="FFC000"/>
+              </a:solidFill>
+              <a:ln>
+                <a:solidFill>
+                  <a:srgbClr val="FFC000"/>
+                </a:solidFill>
+              </a:ln>
+            </p:spPr>
+            <p:style>
+              <a:lnRef idx="2">
+                <a:schemeClr val="accent1">
+                  <a:shade val="50000"/>
+                </a:schemeClr>
+              </a:lnRef>
+              <a:fillRef idx="1">
+                <a:schemeClr val="accent1"/>
+              </a:fillRef>
+              <a:effectRef idx="0">
+                <a:schemeClr val="accent1"/>
+              </a:effectRef>
+              <a:fontRef idx="minor">
+                <a:schemeClr val="lt1"/>
+              </a:fontRef>
+            </p:style>
+            <p:txBody>
+              <a:bodyPr rtlCol="0" anchor="ctr"/>
+              <a:lstStyle/>
+              <a:p>
+                <a:pPr algn="ctr"/>
+                <a:endParaRPr lang="en-US"/>
+              </a:p>
+            </p:txBody>
+          </p:sp>
+        </p:grpSp>
+        <p:grpSp>
+          <p:nvGrpSpPr>
+            <p:cNvPr id="57" name="组合 56">
+              <a:extLst>
+                <a:ext uri="{FF2B5EF4-FFF2-40B4-BE49-F238E27FC236}">
+                  <a16:creationId xmlns:a16="http://schemas.microsoft.com/office/drawing/2014/main" id="{D0E930D3-11D1-492A-A38E-18A1274F4DFB}"/>
+                </a:ext>
+              </a:extLst>
+            </p:cNvPr>
+            <p:cNvGrpSpPr/>
+            <p:nvPr/>
+          </p:nvGrpSpPr>
+          <p:grpSpPr>
+            <a:xfrm>
+              <a:off x="5177430" y="3028990"/>
+              <a:ext cx="612668" cy="991252"/>
+              <a:chOff x="4359294" y="3002356"/>
+              <a:chExt cx="612668" cy="991252"/>
+            </a:xfrm>
+          </p:grpSpPr>
+          <p:sp>
+            <p:nvSpPr>
+              <p:cNvPr id="58" name="文本框 57">
+                <a:extLst>
+                  <a:ext uri="{FF2B5EF4-FFF2-40B4-BE49-F238E27FC236}">
+                    <a16:creationId xmlns:a16="http://schemas.microsoft.com/office/drawing/2014/main" id="{2FBBE4FA-715B-45D7-B188-C45B8FAE0A7A}"/>
+                  </a:ext>
+                </a:extLst>
+              </p:cNvPr>
+              <p:cNvSpPr txBox="1"/>
+              <p:nvPr/>
+            </p:nvSpPr>
+            <p:spPr>
+              <a:xfrm>
+                <a:off x="4359294" y="3593498"/>
+                <a:ext cx="612668" cy="400110"/>
+              </a:xfrm>
+              <a:prstGeom prst="rect">
+                <a:avLst/>
+              </a:prstGeom>
+              <a:noFill/>
+            </p:spPr>
+            <p:txBody>
+              <a:bodyPr wrap="none" rtlCol="0">
+                <a:spAutoFit/>
+              </a:bodyPr>
+              <a:lstStyle/>
+              <a:p>
+                <a:r>
+                  <a:rPr lang="en-US" sz="2000" b="1">
+                    <a:solidFill>
+                      <a:schemeClr val="bg1">
+                        <a:lumMod val="50000"/>
+                      </a:schemeClr>
+                    </a:solidFill>
+                  </a:rPr>
+                  <a:t>CH1</a:t>
+                </a:r>
+              </a:p>
+            </p:txBody>
+          </p:sp>
+          <p:cxnSp>
+            <p:nvCxnSpPr>
+              <p:cNvPr id="60" name="直接连接符 59">
+                <a:extLst>
+                  <a:ext uri="{FF2B5EF4-FFF2-40B4-BE49-F238E27FC236}">
+                    <a16:creationId xmlns:a16="http://schemas.microsoft.com/office/drawing/2014/main" id="{104B784C-8C09-47F0-93F7-D8F89D8FC6D9}"/>
+                  </a:ext>
+                </a:extLst>
+              </p:cNvPr>
+              <p:cNvCxnSpPr>
+                <a:stCxn id="58" idx="0"/>
+              </p:cNvCxnSpPr>
+              <p:nvPr/>
+            </p:nvCxnSpPr>
+            <p:spPr>
+              <a:xfrm flipV="1">
+                <a:off x="4665628" y="3053918"/>
+                <a:ext cx="0" cy="539580"/>
+              </a:xfrm>
+              <a:prstGeom prst="line">
+                <a:avLst/>
+              </a:prstGeom>
+              <a:ln w="9525" cap="flat" cmpd="sng" algn="ctr">
+                <a:solidFill>
+                  <a:schemeClr val="accent3"/>
+                </a:solidFill>
+                <a:prstDash val="dash"/>
+                <a:round/>
+                <a:headEnd type="none" w="med" len="med"/>
+                <a:tailEnd type="none" w="med" len="med"/>
+              </a:ln>
+            </p:spPr>
+            <p:style>
+              <a:lnRef idx="0">
+                <a:scrgbClr r="0" g="0" b="0"/>
+              </a:lnRef>
+              <a:fillRef idx="0">
+                <a:scrgbClr r="0" g="0" b="0"/>
+              </a:fillRef>
+              <a:effectRef idx="0">
+                <a:scrgbClr r="0" g="0" b="0"/>
+              </a:effectRef>
+              <a:fontRef idx="minor">
+                <a:schemeClr val="tx1"/>
+              </a:fontRef>
+            </p:style>
+          </p:cxnSp>
+          <p:sp>
+            <p:nvSpPr>
+              <p:cNvPr id="61" name="椭圆 60">
+                <a:extLst>
+                  <a:ext uri="{FF2B5EF4-FFF2-40B4-BE49-F238E27FC236}">
+                    <a16:creationId xmlns:a16="http://schemas.microsoft.com/office/drawing/2014/main" id="{22248BA4-788E-4260-9C3D-6127AF80B168}"/>
+                  </a:ext>
+                </a:extLst>
+              </p:cNvPr>
+              <p:cNvSpPr>
+                <a:spLocks noChangeAspect="1"/>
+              </p:cNvSpPr>
+              <p:nvPr/>
+            </p:nvSpPr>
+            <p:spPr>
+              <a:xfrm>
+                <a:off x="4604830" y="3002356"/>
+                <a:ext cx="103124" cy="103124"/>
+              </a:xfrm>
+              <a:prstGeom prst="ellipse">
+                <a:avLst/>
+              </a:prstGeom>
+              <a:solidFill>
+                <a:srgbClr val="FFC000"/>
+              </a:solidFill>
+              <a:ln>
+                <a:solidFill>
+                  <a:srgbClr val="FFC000"/>
+                </a:solidFill>
+              </a:ln>
+            </p:spPr>
+            <p:style>
+              <a:lnRef idx="2">
+                <a:schemeClr val="accent1">
+                  <a:shade val="50000"/>
+                </a:schemeClr>
+              </a:lnRef>
+              <a:fillRef idx="1">
+                <a:schemeClr val="accent1"/>
+              </a:fillRef>
+              <a:effectRef idx="0">
+                <a:schemeClr val="accent1"/>
+              </a:effectRef>
+              <a:fontRef idx="minor">
+                <a:schemeClr val="lt1"/>
+              </a:fontRef>
+            </p:style>
+            <p:txBody>
+              <a:bodyPr rtlCol="0" anchor="ctr"/>
+              <a:lstStyle/>
+              <a:p>
+                <a:pPr algn="ctr"/>
+                <a:endParaRPr lang="en-US"/>
+              </a:p>
+            </p:txBody>
+          </p:sp>
+        </p:grpSp>
+        <p:grpSp>
+          <p:nvGrpSpPr>
+            <p:cNvPr id="68" name="组合 67">
+              <a:extLst>
+                <a:ext uri="{FF2B5EF4-FFF2-40B4-BE49-F238E27FC236}">
+                  <a16:creationId xmlns:a16="http://schemas.microsoft.com/office/drawing/2014/main" id="{3A3D09F2-0AB1-46B5-BF5D-B1896646880D}"/>
+                </a:ext>
+              </a:extLst>
+            </p:cNvPr>
+            <p:cNvGrpSpPr/>
+            <p:nvPr/>
+          </p:nvGrpSpPr>
+          <p:grpSpPr>
+            <a:xfrm>
+              <a:off x="6190876" y="3028990"/>
+              <a:ext cx="612668" cy="991252"/>
+              <a:chOff x="4359294" y="3002356"/>
+              <a:chExt cx="612668" cy="991252"/>
+            </a:xfrm>
+          </p:grpSpPr>
+          <p:sp>
+            <p:nvSpPr>
+              <p:cNvPr id="70" name="文本框 69">
+                <a:extLst>
+                  <a:ext uri="{FF2B5EF4-FFF2-40B4-BE49-F238E27FC236}">
+                    <a16:creationId xmlns:a16="http://schemas.microsoft.com/office/drawing/2014/main" id="{9C8714B8-7EE0-4B66-A5CB-D70DE9303A2D}"/>
+                  </a:ext>
+                </a:extLst>
+              </p:cNvPr>
+              <p:cNvSpPr txBox="1"/>
+              <p:nvPr/>
+            </p:nvSpPr>
+            <p:spPr>
+              <a:xfrm>
+                <a:off x="4359294" y="3593498"/>
+                <a:ext cx="612668" cy="400110"/>
+              </a:xfrm>
+              <a:prstGeom prst="rect">
+                <a:avLst/>
+              </a:prstGeom>
+              <a:noFill/>
+            </p:spPr>
+            <p:txBody>
+              <a:bodyPr wrap="none" rtlCol="0">
+                <a:spAutoFit/>
+              </a:bodyPr>
+              <a:lstStyle/>
+              <a:p>
+                <a:r>
+                  <a:rPr lang="en-US" sz="2000" b="1">
+                    <a:solidFill>
+                      <a:schemeClr val="bg1">
+                        <a:lumMod val="50000"/>
+                      </a:schemeClr>
+                    </a:solidFill>
+                  </a:rPr>
+                  <a:t>CH2</a:t>
+                </a:r>
+              </a:p>
+            </p:txBody>
+          </p:sp>
+          <p:cxnSp>
+            <p:nvCxnSpPr>
+              <p:cNvPr id="77" name="直接连接符 76">
+                <a:extLst>
+                  <a:ext uri="{FF2B5EF4-FFF2-40B4-BE49-F238E27FC236}">
+                    <a16:creationId xmlns:a16="http://schemas.microsoft.com/office/drawing/2014/main" id="{DB24607C-90D9-4CEF-8069-E01927104AEE}"/>
+                  </a:ext>
+                </a:extLst>
+              </p:cNvPr>
+              <p:cNvCxnSpPr>
+                <a:stCxn id="70" idx="0"/>
+              </p:cNvCxnSpPr>
+              <p:nvPr/>
+            </p:nvCxnSpPr>
+            <p:spPr>
+              <a:xfrm flipV="1">
+                <a:off x="4665628" y="3053918"/>
+                <a:ext cx="0" cy="539580"/>
+              </a:xfrm>
+              <a:prstGeom prst="line">
+                <a:avLst/>
+              </a:prstGeom>
+              <a:ln w="9525" cap="flat" cmpd="sng" algn="ctr">
+                <a:solidFill>
+                  <a:schemeClr val="accent3"/>
+                </a:solidFill>
+                <a:prstDash val="dash"/>
+                <a:round/>
+                <a:headEnd type="none" w="med" len="med"/>
+                <a:tailEnd type="none" w="med" len="med"/>
+              </a:ln>
+            </p:spPr>
+            <p:style>
+              <a:lnRef idx="0">
+                <a:scrgbClr r="0" g="0" b="0"/>
+              </a:lnRef>
+              <a:fillRef idx="0">
+                <a:scrgbClr r="0" g="0" b="0"/>
+              </a:fillRef>
+              <a:effectRef idx="0">
+                <a:scrgbClr r="0" g="0" b="0"/>
+              </a:effectRef>
+              <a:fontRef idx="minor">
+                <a:schemeClr val="tx1"/>
+              </a:fontRef>
+            </p:style>
+          </p:cxnSp>
+          <p:sp>
+            <p:nvSpPr>
+              <p:cNvPr id="78" name="椭圆 77">
+                <a:extLst>
+                  <a:ext uri="{FF2B5EF4-FFF2-40B4-BE49-F238E27FC236}">
+                    <a16:creationId xmlns:a16="http://schemas.microsoft.com/office/drawing/2014/main" id="{5DAC8683-EDD5-4A3F-B2C5-042515936EF9}"/>
+                  </a:ext>
+                </a:extLst>
+              </p:cNvPr>
+              <p:cNvSpPr>
+                <a:spLocks noChangeAspect="1"/>
+              </p:cNvSpPr>
+              <p:nvPr/>
+            </p:nvSpPr>
+            <p:spPr>
+              <a:xfrm>
+                <a:off x="4604830" y="3002356"/>
+                <a:ext cx="103124" cy="103124"/>
+              </a:xfrm>
+              <a:prstGeom prst="ellipse">
+                <a:avLst/>
+              </a:prstGeom>
+              <a:solidFill>
+                <a:srgbClr val="FFC000"/>
+              </a:solidFill>
+              <a:ln>
+                <a:solidFill>
+                  <a:srgbClr val="FFC000"/>
+                </a:solidFill>
+              </a:ln>
+            </p:spPr>
+            <p:style>
+              <a:lnRef idx="2">
+                <a:schemeClr val="accent1">
+                  <a:shade val="50000"/>
+                </a:schemeClr>
+              </a:lnRef>
+              <a:fillRef idx="1">
+                <a:schemeClr val="accent1"/>
+              </a:fillRef>
+              <a:effectRef idx="0">
+                <a:schemeClr val="accent1"/>
+              </a:effectRef>
+              <a:fontRef idx="minor">
+                <a:schemeClr val="lt1"/>
+              </a:fontRef>
+            </p:style>
+            <p:txBody>
+              <a:bodyPr rtlCol="0" anchor="ctr"/>
+              <a:lstStyle/>
+              <a:p>
+                <a:pPr algn="ctr"/>
+                <a:endParaRPr lang="en-US"/>
+              </a:p>
+            </p:txBody>
+          </p:sp>
+        </p:grpSp>
+        <p:grpSp>
+          <p:nvGrpSpPr>
+            <p:cNvPr id="79" name="组合 78">
+              <a:extLst>
+                <a:ext uri="{FF2B5EF4-FFF2-40B4-BE49-F238E27FC236}">
+                  <a16:creationId xmlns:a16="http://schemas.microsoft.com/office/drawing/2014/main" id="{30677C71-E4E8-4144-A86E-07C09101435E}"/>
+                </a:ext>
+              </a:extLst>
+            </p:cNvPr>
+            <p:cNvGrpSpPr/>
+            <p:nvPr/>
+          </p:nvGrpSpPr>
+          <p:grpSpPr>
+            <a:xfrm>
+              <a:off x="7009012" y="3028990"/>
+              <a:ext cx="612668" cy="991252"/>
+              <a:chOff x="4359294" y="3002356"/>
+              <a:chExt cx="612668" cy="991252"/>
+            </a:xfrm>
+          </p:grpSpPr>
+          <p:sp>
+            <p:nvSpPr>
+              <p:cNvPr id="80" name="文本框 79">
+                <a:extLst>
+                  <a:ext uri="{FF2B5EF4-FFF2-40B4-BE49-F238E27FC236}">
+                    <a16:creationId xmlns:a16="http://schemas.microsoft.com/office/drawing/2014/main" id="{F29D7FC3-51E5-4761-A06D-95886093BF59}"/>
+                  </a:ext>
+                </a:extLst>
+              </p:cNvPr>
+              <p:cNvSpPr txBox="1"/>
+              <p:nvPr/>
+            </p:nvSpPr>
+            <p:spPr>
+              <a:xfrm>
+                <a:off x="4359294" y="3593498"/>
+                <a:ext cx="612668" cy="400110"/>
+              </a:xfrm>
+              <a:prstGeom prst="rect">
+                <a:avLst/>
+              </a:prstGeom>
+              <a:noFill/>
+            </p:spPr>
+            <p:txBody>
+              <a:bodyPr wrap="none" rtlCol="0">
+                <a:spAutoFit/>
+              </a:bodyPr>
+              <a:lstStyle/>
+              <a:p>
+                <a:r>
+                  <a:rPr lang="en-US" sz="2000" b="1">
+                    <a:solidFill>
+                      <a:schemeClr val="bg1">
+                        <a:lumMod val="50000"/>
+                      </a:schemeClr>
+                    </a:solidFill>
+                  </a:rPr>
+                  <a:t>CH3</a:t>
+                </a:r>
+              </a:p>
+            </p:txBody>
+          </p:sp>
+          <p:cxnSp>
+            <p:nvCxnSpPr>
+              <p:cNvPr id="81" name="直接连接符 80">
+                <a:extLst>
+                  <a:ext uri="{FF2B5EF4-FFF2-40B4-BE49-F238E27FC236}">
+                    <a16:creationId xmlns:a16="http://schemas.microsoft.com/office/drawing/2014/main" id="{C74216C3-A632-4B54-9731-2534CCC24C97}"/>
+                  </a:ext>
+                </a:extLst>
+              </p:cNvPr>
+              <p:cNvCxnSpPr>
+                <a:stCxn id="80" idx="0"/>
+              </p:cNvCxnSpPr>
+              <p:nvPr/>
+            </p:nvCxnSpPr>
+            <p:spPr>
+              <a:xfrm flipV="1">
+                <a:off x="4665628" y="3053918"/>
+                <a:ext cx="0" cy="539580"/>
+              </a:xfrm>
+              <a:prstGeom prst="line">
+                <a:avLst/>
+              </a:prstGeom>
+              <a:ln w="9525" cap="flat" cmpd="sng" algn="ctr">
+                <a:solidFill>
+                  <a:schemeClr val="accent3"/>
+                </a:solidFill>
+                <a:prstDash val="dash"/>
+                <a:round/>
+                <a:headEnd type="none" w="med" len="med"/>
+                <a:tailEnd type="none" w="med" len="med"/>
+              </a:ln>
+            </p:spPr>
+            <p:style>
+              <a:lnRef idx="0">
+                <a:scrgbClr r="0" g="0" b="0"/>
+              </a:lnRef>
+              <a:fillRef idx="0">
+                <a:scrgbClr r="0" g="0" b="0"/>
+              </a:fillRef>
+              <a:effectRef idx="0">
+                <a:scrgbClr r="0" g="0" b="0"/>
+              </a:effectRef>
+              <a:fontRef idx="minor">
+                <a:schemeClr val="tx1"/>
+              </a:fontRef>
+            </p:style>
+          </p:cxnSp>
+          <p:sp>
+            <p:nvSpPr>
+              <p:cNvPr id="82" name="椭圆 81">
+                <a:extLst>
+                  <a:ext uri="{FF2B5EF4-FFF2-40B4-BE49-F238E27FC236}">
+                    <a16:creationId xmlns:a16="http://schemas.microsoft.com/office/drawing/2014/main" id="{52F540D5-80CE-4C11-AF6A-343896F0F350}"/>
+                  </a:ext>
+                </a:extLst>
+              </p:cNvPr>
+              <p:cNvSpPr>
+                <a:spLocks noChangeAspect="1"/>
+              </p:cNvSpPr>
+              <p:nvPr/>
+            </p:nvSpPr>
+            <p:spPr>
+              <a:xfrm>
+                <a:off x="4604830" y="3002356"/>
+                <a:ext cx="103124" cy="103124"/>
+              </a:xfrm>
+              <a:prstGeom prst="ellipse">
+                <a:avLst/>
+              </a:prstGeom>
+              <a:solidFill>
+                <a:srgbClr val="FFC000"/>
+              </a:solidFill>
+              <a:ln>
+                <a:solidFill>
+                  <a:srgbClr val="FFC000"/>
+                </a:solidFill>
+              </a:ln>
+            </p:spPr>
+            <p:style>
+              <a:lnRef idx="2">
+                <a:schemeClr val="accent1">
+                  <a:shade val="50000"/>
+                </a:schemeClr>
+              </a:lnRef>
+              <a:fillRef idx="1">
+                <a:schemeClr val="accent1"/>
+              </a:fillRef>
+              <a:effectRef idx="0">
+                <a:schemeClr val="accent1"/>
+              </a:effectRef>
+              <a:fontRef idx="minor">
+                <a:schemeClr val="lt1"/>
+              </a:fontRef>
+            </p:style>
+            <p:txBody>
+              <a:bodyPr rtlCol="0" anchor="ctr"/>
+              <a:lstStyle/>
+              <a:p>
+                <a:pPr algn="ctr"/>
+                <a:endParaRPr lang="en-US"/>
+              </a:p>
+            </p:txBody>
+          </p:sp>
+        </p:grpSp>
+      </p:grpSp>
+      <p:sp>
+        <p:nvSpPr>
+          <p:cNvPr id="99" name="文本框 98">
+            <a:extLst>
+              <a:ext uri="{FF2B5EF4-FFF2-40B4-BE49-F238E27FC236}">
+                <a16:creationId xmlns:a16="http://schemas.microsoft.com/office/drawing/2014/main" id="{BE2F33C6-4C66-46D4-8F4C-969B91F68D06}"/>
+              </a:ext>
+            </a:extLst>
+          </p:cNvPr>
+          <p:cNvSpPr txBox="1"/>
+          <p:nvPr/>
+        </p:nvSpPr>
+        <p:spPr>
+          <a:xfrm>
+            <a:off x="6990540" y="791342"/>
+            <a:ext cx="612668" cy="400110"/>
+          </a:xfrm>
+          <a:prstGeom prst="rect">
+            <a:avLst/>
+          </a:prstGeom>
+          <a:noFill/>
+        </p:spPr>
+        <p:txBody>
+          <a:bodyPr wrap="none" rtlCol="0">
+            <a:spAutoFit/>
+          </a:bodyPr>
+          <a:lstStyle/>
+          <a:p>
+            <a:r>
+              <a:rPr lang="en-US" sz="2000" b="1">
+                <a:solidFill>
+                  <a:schemeClr val="bg1">
+                    <a:lumMod val="50000"/>
+                  </a:schemeClr>
+                </a:solidFill>
+              </a:rPr>
+              <a:t>CH8</a:t>
+            </a:r>
+          </a:p>
+        </p:txBody>
+      </p:sp>
+      <p:cxnSp>
+        <p:nvCxnSpPr>
+          <p:cNvPr id="100" name="直接连接符 99">
+            <a:extLst>
+              <a:ext uri="{FF2B5EF4-FFF2-40B4-BE49-F238E27FC236}">
+                <a16:creationId xmlns:a16="http://schemas.microsoft.com/office/drawing/2014/main" id="{2802487A-FAA6-499C-9DE1-E3F1A0BEC2B8}"/>
+              </a:ext>
+            </a:extLst>
+          </p:cNvPr>
+          <p:cNvCxnSpPr>
+            <a:cxnSpLocks/>
+            <a:stCxn id="99" idx="2"/>
+            <a:endCxn id="101" idx="0"/>
+          </p:cNvCxnSpPr>
+          <p:nvPr/>
+        </p:nvCxnSpPr>
+        <p:spPr>
+          <a:xfrm>
+            <a:off x="7296874" y="1191452"/>
+            <a:ext cx="0" cy="591142"/>
+          </a:xfrm>
+          <a:prstGeom prst="line">
+            <a:avLst/>
+          </a:prstGeom>
+          <a:ln w="9525" cap="flat" cmpd="sng" algn="ctr">
+            <a:solidFill>
+              <a:schemeClr val="accent3"/>
+            </a:solidFill>
+            <a:prstDash val="dash"/>
+            <a:round/>
+            <a:headEnd type="none" w="med" len="med"/>
+            <a:tailEnd type="none" w="med" len="med"/>
+          </a:ln>
+        </p:spPr>
+        <p:style>
+          <a:lnRef idx="0">
+            <a:scrgbClr r="0" g="0" b="0"/>
+          </a:lnRef>
+          <a:fillRef idx="0">
+            <a:scrgbClr r="0" g="0" b="0"/>
+          </a:fillRef>
+          <a:effectRef idx="0">
+            <a:scrgbClr r="0" g="0" b="0"/>
+          </a:effectRef>
+          <a:fontRef idx="minor">
+            <a:schemeClr val="tx1"/>
+          </a:fontRef>
+        </p:style>
+      </p:cxnSp>
+      <p:sp>
+        <p:nvSpPr>
+          <p:cNvPr id="101" name="椭圆 100">
+            <a:extLst>
+              <a:ext uri="{FF2B5EF4-FFF2-40B4-BE49-F238E27FC236}">
+                <a16:creationId xmlns:a16="http://schemas.microsoft.com/office/drawing/2014/main" id="{18397415-8499-4443-B71F-4921F39321ED}"/>
+              </a:ext>
+            </a:extLst>
+          </p:cNvPr>
+          <p:cNvSpPr>
+            <a:spLocks noChangeAspect="1"/>
+          </p:cNvSpPr>
+          <p:nvPr/>
+        </p:nvSpPr>
+        <p:spPr>
+          <a:xfrm rot="10800000">
+            <a:off x="7245312" y="1679470"/>
+            <a:ext cx="103124" cy="103124"/>
+          </a:xfrm>
+          <a:prstGeom prst="ellipse">
+            <a:avLst/>
+          </a:prstGeom>
+          <a:solidFill>
+            <a:srgbClr val="FFC000"/>
+          </a:solidFill>
+          <a:ln>
+            <a:solidFill>
+              <a:srgbClr val="FFC000"/>
+            </a:solidFill>
+          </a:ln>
+        </p:spPr>
+        <p:style>
+          <a:lnRef idx="2">
+            <a:schemeClr val="accent1">
+              <a:shade val="50000"/>
+            </a:schemeClr>
+          </a:lnRef>
+          <a:fillRef idx="1">
+            <a:schemeClr val="accent1"/>
+          </a:fillRef>
+          <a:effectRef idx="0">
+            <a:schemeClr val="accent1"/>
+          </a:effectRef>
+          <a:fontRef idx="minor">
+            <a:schemeClr val="lt1"/>
+          </a:fontRef>
+        </p:style>
+        <p:txBody>
+          <a:bodyPr rtlCol="0" anchor="ctr"/>
+          <a:lstStyle/>
+          <a:p>
+            <a:pPr algn="ctr"/>
+            <a:endParaRPr lang="en-US"/>
+          </a:p>
+        </p:txBody>
+      </p:sp>
+      <p:sp>
+        <p:nvSpPr>
+          <p:cNvPr id="96" name="文本框 95">
+            <a:extLst>
+              <a:ext uri="{FF2B5EF4-FFF2-40B4-BE49-F238E27FC236}">
+                <a16:creationId xmlns:a16="http://schemas.microsoft.com/office/drawing/2014/main" id="{F36B34B9-9FDE-4E9A-B5C3-549849E1BBAC}"/>
+              </a:ext>
+            </a:extLst>
+          </p:cNvPr>
+          <p:cNvSpPr txBox="1"/>
+          <p:nvPr/>
+        </p:nvSpPr>
+        <p:spPr>
+          <a:xfrm>
+            <a:off x="6172404" y="791342"/>
+            <a:ext cx="612668" cy="400110"/>
+          </a:xfrm>
+          <a:prstGeom prst="rect">
+            <a:avLst/>
+          </a:prstGeom>
+          <a:noFill/>
+        </p:spPr>
+        <p:txBody>
+          <a:bodyPr wrap="none" rtlCol="0">
+            <a:spAutoFit/>
+          </a:bodyPr>
+          <a:lstStyle/>
+          <a:p>
+            <a:r>
+              <a:rPr lang="en-US" sz="2000" b="1">
+                <a:solidFill>
+                  <a:schemeClr val="bg1">
+                    <a:lumMod val="50000"/>
+                  </a:schemeClr>
+                </a:solidFill>
+              </a:rPr>
+              <a:t>CH9</a:t>
+            </a:r>
+          </a:p>
+        </p:txBody>
+      </p:sp>
+      <p:cxnSp>
+        <p:nvCxnSpPr>
+          <p:cNvPr id="97" name="直接连接符 96">
+            <a:extLst>
+              <a:ext uri="{FF2B5EF4-FFF2-40B4-BE49-F238E27FC236}">
+                <a16:creationId xmlns:a16="http://schemas.microsoft.com/office/drawing/2014/main" id="{D648D03C-3CB3-49DD-9B38-FE05219AE201}"/>
+              </a:ext>
+            </a:extLst>
+          </p:cNvPr>
+          <p:cNvCxnSpPr>
+            <a:cxnSpLocks/>
+            <a:stCxn id="98" idx="4"/>
+            <a:endCxn id="96" idx="2"/>
+          </p:cNvCxnSpPr>
+          <p:nvPr/>
+        </p:nvCxnSpPr>
+        <p:spPr>
+          <a:xfrm flipV="1">
+            <a:off x="6478738" y="1191452"/>
+            <a:ext cx="0" cy="488018"/>
+          </a:xfrm>
+          <a:prstGeom prst="line">
+            <a:avLst/>
+          </a:prstGeom>
+          <a:ln w="9525" cap="flat" cmpd="sng" algn="ctr">
+            <a:solidFill>
+              <a:schemeClr val="accent3"/>
+            </a:solidFill>
+            <a:prstDash val="dash"/>
+            <a:round/>
+            <a:headEnd type="none" w="med" len="med"/>
+            <a:tailEnd type="none" w="med" len="med"/>
+          </a:ln>
+        </p:spPr>
+        <p:style>
+          <a:lnRef idx="0">
+            <a:scrgbClr r="0" g="0" b="0"/>
+          </a:lnRef>
+          <a:fillRef idx="0">
+            <a:scrgbClr r="0" g="0" b="0"/>
+          </a:fillRef>
+          <a:effectRef idx="0">
+            <a:scrgbClr r="0" g="0" b="0"/>
+          </a:effectRef>
+          <a:fontRef idx="minor">
+            <a:schemeClr val="tx1"/>
+          </a:fontRef>
+        </p:style>
+      </p:cxnSp>
+      <p:sp>
+        <p:nvSpPr>
+          <p:cNvPr id="98" name="椭圆 97">
+            <a:extLst>
+              <a:ext uri="{FF2B5EF4-FFF2-40B4-BE49-F238E27FC236}">
+                <a16:creationId xmlns:a16="http://schemas.microsoft.com/office/drawing/2014/main" id="{F33A2145-629D-426D-8023-A57FB111F207}"/>
+              </a:ext>
+            </a:extLst>
+          </p:cNvPr>
+          <p:cNvSpPr>
+            <a:spLocks noChangeAspect="1"/>
+          </p:cNvSpPr>
+          <p:nvPr/>
+        </p:nvSpPr>
+        <p:spPr>
+          <a:xfrm rot="10800000">
+            <a:off x="6427176" y="1679470"/>
+            <a:ext cx="103124" cy="103124"/>
+          </a:xfrm>
+          <a:prstGeom prst="ellipse">
+            <a:avLst/>
+          </a:prstGeom>
+          <a:solidFill>
+            <a:srgbClr val="FFC000"/>
+          </a:solidFill>
+          <a:ln>
+            <a:solidFill>
+              <a:srgbClr val="FFC000"/>
+            </a:solidFill>
+          </a:ln>
+        </p:spPr>
+        <p:style>
+          <a:lnRef idx="2">
+            <a:schemeClr val="accent1">
+              <a:shade val="50000"/>
+            </a:schemeClr>
+          </a:lnRef>
+          <a:fillRef idx="1">
+            <a:schemeClr val="accent1"/>
+          </a:fillRef>
+          <a:effectRef idx="0">
+            <a:schemeClr val="accent1"/>
+          </a:effectRef>
+          <a:fontRef idx="minor">
+            <a:schemeClr val="lt1"/>
+          </a:fontRef>
+        </p:style>
+        <p:txBody>
+          <a:bodyPr rtlCol="0" anchor="ctr"/>
+          <a:lstStyle/>
+          <a:p>
+            <a:pPr algn="ctr"/>
+            <a:endParaRPr lang="en-US"/>
+          </a:p>
+        </p:txBody>
+      </p:sp>
+      <p:sp>
+        <p:nvSpPr>
+          <p:cNvPr id="93" name="文本框 92">
+            <a:extLst>
+              <a:ext uri="{FF2B5EF4-FFF2-40B4-BE49-F238E27FC236}">
+                <a16:creationId xmlns:a16="http://schemas.microsoft.com/office/drawing/2014/main" id="{A3874D2B-D53F-4591-B75B-5EF98B42D660}"/>
+              </a:ext>
+            </a:extLst>
+          </p:cNvPr>
+          <p:cNvSpPr txBox="1"/>
+          <p:nvPr/>
+        </p:nvSpPr>
+        <p:spPr>
+          <a:xfrm>
+            <a:off x="5158958" y="791342"/>
+            <a:ext cx="742511" cy="400110"/>
+          </a:xfrm>
+          <a:prstGeom prst="rect">
+            <a:avLst/>
+          </a:prstGeom>
+          <a:noFill/>
+        </p:spPr>
+        <p:txBody>
+          <a:bodyPr wrap="none" rtlCol="0">
+            <a:spAutoFit/>
+          </a:bodyPr>
+          <a:lstStyle/>
+          <a:p>
+            <a:r>
+              <a:rPr lang="en-US" sz="2000" b="1">
+                <a:solidFill>
+                  <a:schemeClr val="bg1">
+                    <a:lumMod val="50000"/>
+                  </a:schemeClr>
+                </a:solidFill>
+              </a:rPr>
+              <a:t>CH10</a:t>
+            </a:r>
+          </a:p>
+        </p:txBody>
+      </p:sp>
+      <p:cxnSp>
+        <p:nvCxnSpPr>
+          <p:cNvPr id="94" name="直接连接符 93">
+            <a:extLst>
+              <a:ext uri="{FF2B5EF4-FFF2-40B4-BE49-F238E27FC236}">
+                <a16:creationId xmlns:a16="http://schemas.microsoft.com/office/drawing/2014/main" id="{78F23338-3778-45EB-8780-9C4031F24A19}"/>
+              </a:ext>
+            </a:extLst>
+          </p:cNvPr>
+          <p:cNvCxnSpPr>
+            <a:cxnSpLocks/>
+          </p:cNvCxnSpPr>
+          <p:nvPr/>
+        </p:nvCxnSpPr>
+        <p:spPr>
+          <a:xfrm>
+            <a:off x="5465294" y="1224068"/>
+            <a:ext cx="0" cy="506964"/>
+          </a:xfrm>
+          <a:prstGeom prst="line">
+            <a:avLst/>
+          </a:prstGeom>
+          <a:ln w="9525" cap="flat" cmpd="sng" algn="ctr">
+            <a:solidFill>
+              <a:schemeClr val="accent3"/>
+            </a:solidFill>
+            <a:prstDash val="dash"/>
+            <a:round/>
+            <a:headEnd type="none" w="med" len="med"/>
+            <a:tailEnd type="none" w="med" len="med"/>
+          </a:ln>
+        </p:spPr>
+        <p:style>
+          <a:lnRef idx="0">
+            <a:scrgbClr r="0" g="0" b="0"/>
+          </a:lnRef>
+          <a:fillRef idx="0">
+            <a:scrgbClr r="0" g="0" b="0"/>
+          </a:fillRef>
+          <a:effectRef idx="0">
+            <a:scrgbClr r="0" g="0" b="0"/>
+          </a:effectRef>
+          <a:fontRef idx="minor">
+            <a:schemeClr val="tx1"/>
+          </a:fontRef>
+        </p:style>
+      </p:cxnSp>
+      <p:sp>
+        <p:nvSpPr>
+          <p:cNvPr id="95" name="椭圆 94">
+            <a:extLst>
+              <a:ext uri="{FF2B5EF4-FFF2-40B4-BE49-F238E27FC236}">
+                <a16:creationId xmlns:a16="http://schemas.microsoft.com/office/drawing/2014/main" id="{7513822D-1476-420E-9EA4-BDAC8378537F}"/>
+              </a:ext>
+            </a:extLst>
+          </p:cNvPr>
+          <p:cNvSpPr>
+            <a:spLocks noChangeAspect="1"/>
+          </p:cNvSpPr>
+          <p:nvPr/>
+        </p:nvSpPr>
+        <p:spPr>
+          <a:xfrm>
+            <a:off x="5413730" y="1679470"/>
+            <a:ext cx="103124" cy="103124"/>
+          </a:xfrm>
+          <a:prstGeom prst="ellipse">
+            <a:avLst/>
+          </a:prstGeom>
+          <a:solidFill>
+            <a:srgbClr val="FFC000"/>
+          </a:solidFill>
+          <a:ln>
+            <a:solidFill>
+              <a:srgbClr val="FFC000"/>
+            </a:solidFill>
+          </a:ln>
+        </p:spPr>
+        <p:style>
+          <a:lnRef idx="2">
+            <a:schemeClr val="accent1">
+              <a:shade val="50000"/>
+            </a:schemeClr>
+          </a:lnRef>
+          <a:fillRef idx="1">
+            <a:schemeClr val="accent1"/>
+          </a:fillRef>
+          <a:effectRef idx="0">
+            <a:schemeClr val="accent1"/>
+          </a:effectRef>
+          <a:fontRef idx="minor">
+            <a:schemeClr val="lt1"/>
+          </a:fontRef>
+        </p:style>
+        <p:txBody>
+          <a:bodyPr rtlCol="0" anchor="ctr"/>
+          <a:lstStyle/>
+          <a:p>
+            <a:pPr algn="ctr"/>
+            <a:endParaRPr lang="en-US"/>
+          </a:p>
+        </p:txBody>
+      </p:sp>
+      <p:sp>
+        <p:nvSpPr>
+          <p:cNvPr id="90" name="文本框 89">
+            <a:extLst>
+              <a:ext uri="{FF2B5EF4-FFF2-40B4-BE49-F238E27FC236}">
+                <a16:creationId xmlns:a16="http://schemas.microsoft.com/office/drawing/2014/main" id="{3099DC2B-B5C0-47FF-B017-1F8DC9093061}"/>
+              </a:ext>
+            </a:extLst>
+          </p:cNvPr>
+          <p:cNvSpPr txBox="1"/>
+          <p:nvPr/>
+        </p:nvSpPr>
+        <p:spPr>
+          <a:xfrm>
+            <a:off x="4340822" y="791342"/>
+            <a:ext cx="742511" cy="400110"/>
+          </a:xfrm>
+          <a:prstGeom prst="rect">
+            <a:avLst/>
+          </a:prstGeom>
+          <a:noFill/>
+        </p:spPr>
+        <p:txBody>
+          <a:bodyPr wrap="none" rtlCol="0">
+            <a:spAutoFit/>
+          </a:bodyPr>
+          <a:lstStyle/>
+          <a:p>
+            <a:r>
+              <a:rPr lang="en-US" sz="2000" b="1">
+                <a:solidFill>
+                  <a:schemeClr val="bg1">
+                    <a:lumMod val="50000"/>
+                  </a:schemeClr>
+                </a:solidFill>
+              </a:rPr>
+              <a:t>CH11</a:t>
+            </a:r>
+          </a:p>
+        </p:txBody>
+      </p:sp>
+      <p:cxnSp>
+        <p:nvCxnSpPr>
+          <p:cNvPr id="91" name="直接连接符 90">
+            <a:extLst>
+              <a:ext uri="{FF2B5EF4-FFF2-40B4-BE49-F238E27FC236}">
+                <a16:creationId xmlns:a16="http://schemas.microsoft.com/office/drawing/2014/main" id="{5B428E26-99AC-4067-8DFC-854E5CFE6E70}"/>
+              </a:ext>
+            </a:extLst>
+          </p:cNvPr>
+          <p:cNvCxnSpPr>
+            <a:cxnSpLocks/>
+          </p:cNvCxnSpPr>
+          <p:nvPr/>
+        </p:nvCxnSpPr>
+        <p:spPr>
+          <a:xfrm>
+            <a:off x="4647156" y="1191451"/>
+            <a:ext cx="0" cy="539581"/>
+          </a:xfrm>
+          <a:prstGeom prst="line">
+            <a:avLst/>
+          </a:prstGeom>
+          <a:ln w="9525" cap="flat" cmpd="sng" algn="ctr">
+            <a:solidFill>
+              <a:schemeClr val="accent3"/>
+            </a:solidFill>
+            <a:prstDash val="dash"/>
+            <a:round/>
+            <a:headEnd type="none" w="med" len="med"/>
+            <a:tailEnd type="none" w="med" len="med"/>
+          </a:ln>
+        </p:spPr>
+        <p:style>
+          <a:lnRef idx="0">
+            <a:scrgbClr r="0" g="0" b="0"/>
+          </a:lnRef>
+          <a:fillRef idx="0">
+            <a:scrgbClr r="0" g="0" b="0"/>
+          </a:fillRef>
+          <a:effectRef idx="0">
+            <a:scrgbClr r="0" g="0" b="0"/>
+          </a:effectRef>
+          <a:fontRef idx="minor">
+            <a:schemeClr val="tx1"/>
+          </a:fontRef>
+        </p:style>
+      </p:cxnSp>
+      <p:sp>
+        <p:nvSpPr>
+          <p:cNvPr id="92" name="椭圆 91">
+            <a:extLst>
+              <a:ext uri="{FF2B5EF4-FFF2-40B4-BE49-F238E27FC236}">
+                <a16:creationId xmlns:a16="http://schemas.microsoft.com/office/drawing/2014/main" id="{BD710605-38BD-4F5D-A1CA-162DFC79218D}"/>
+              </a:ext>
+            </a:extLst>
+          </p:cNvPr>
+          <p:cNvSpPr>
+            <a:spLocks noChangeAspect="1"/>
+          </p:cNvSpPr>
+          <p:nvPr/>
+        </p:nvSpPr>
+        <p:spPr>
+          <a:xfrm rot="10800000">
+            <a:off x="4595594" y="1679470"/>
+            <a:ext cx="103124" cy="103124"/>
+          </a:xfrm>
+          <a:prstGeom prst="ellipse">
+            <a:avLst/>
+          </a:prstGeom>
+          <a:solidFill>
+            <a:srgbClr val="FFC000"/>
+          </a:solidFill>
+          <a:ln>
+            <a:solidFill>
+              <a:srgbClr val="FFC000"/>
+            </a:solidFill>
+          </a:ln>
+        </p:spPr>
+        <p:style>
+          <a:lnRef idx="2">
+            <a:schemeClr val="accent1">
+              <a:shade val="50000"/>
+            </a:schemeClr>
+          </a:lnRef>
+          <a:fillRef idx="1">
+            <a:schemeClr val="accent1"/>
+          </a:fillRef>
+          <a:effectRef idx="0">
+            <a:schemeClr val="accent1"/>
+          </a:effectRef>
+          <a:fontRef idx="minor">
+            <a:schemeClr val="lt1"/>
+          </a:fontRef>
+        </p:style>
+        <p:txBody>
+          <a:bodyPr rtlCol="0" anchor="ctr"/>
+          <a:lstStyle/>
+          <a:p>
+            <a:pPr algn="ctr"/>
+            <a:endParaRPr lang="en-US"/>
+          </a:p>
+        </p:txBody>
+      </p:sp>
+      <p:grpSp>
+        <p:nvGrpSpPr>
+          <p:cNvPr id="124" name="组合 123">
+            <a:extLst>
+              <a:ext uri="{FF2B5EF4-FFF2-40B4-BE49-F238E27FC236}">
+                <a16:creationId xmlns:a16="http://schemas.microsoft.com/office/drawing/2014/main" id="{BA62DEC2-1AC6-4513-A001-0312431ABCC3}"/>
+              </a:ext>
+            </a:extLst>
+          </p:cNvPr>
+          <p:cNvGrpSpPr/>
+          <p:nvPr/>
+        </p:nvGrpSpPr>
+        <p:grpSpPr>
+          <a:xfrm>
+            <a:off x="9260523" y="1475848"/>
+            <a:ext cx="678391" cy="1854168"/>
+            <a:chOff x="8981402" y="1469498"/>
+            <a:chExt cx="678391" cy="1854168"/>
+          </a:xfrm>
+        </p:grpSpPr>
+        <p:sp>
+          <p:nvSpPr>
+            <p:cNvPr id="65" name="文本框 64">
+              <a:extLst>
+                <a:ext uri="{FF2B5EF4-FFF2-40B4-BE49-F238E27FC236}">
+                  <a16:creationId xmlns:a16="http://schemas.microsoft.com/office/drawing/2014/main" id="{5731F7A2-BE59-4DD7-9B57-3E55F7B81C8C}"/>
+                </a:ext>
+              </a:extLst>
+            </p:cNvPr>
+            <p:cNvSpPr txBox="1"/>
+            <p:nvPr/>
+          </p:nvSpPr>
+          <p:spPr>
+            <a:xfrm>
+              <a:off x="8981402" y="1469498"/>
+              <a:ext cx="678391" cy="400110"/>
+            </a:xfrm>
+            <a:prstGeom prst="rect">
+              <a:avLst/>
+            </a:prstGeom>
+            <a:noFill/>
+          </p:spPr>
+          <p:txBody>
+            <a:bodyPr wrap="none" rtlCol="0">
+              <a:spAutoFit/>
+            </a:bodyPr>
+            <a:lstStyle/>
+            <a:p>
+              <a:r>
+                <a:rPr lang="en-US" sz="2000" b="1">
+                  <a:solidFill>
+                    <a:schemeClr val="bg1">
+                      <a:lumMod val="50000"/>
+                    </a:schemeClr>
+                  </a:solidFill>
+                </a:rPr>
+                <a:t>GND</a:t>
+              </a:r>
+            </a:p>
+          </p:txBody>
+        </p:sp>
+        <p:sp>
+          <p:nvSpPr>
+            <p:cNvPr id="102" name="文本框 101">
+              <a:extLst>
+                <a:ext uri="{FF2B5EF4-FFF2-40B4-BE49-F238E27FC236}">
+                  <a16:creationId xmlns:a16="http://schemas.microsoft.com/office/drawing/2014/main" id="{3D899BE2-A710-41F5-BAF1-87C45D71D32B}"/>
+                </a:ext>
+              </a:extLst>
+            </p:cNvPr>
+            <p:cNvSpPr txBox="1"/>
+            <p:nvPr/>
+          </p:nvSpPr>
+          <p:spPr>
+            <a:xfrm>
+              <a:off x="8981402" y="1833013"/>
+              <a:ext cx="612668" cy="400110"/>
+            </a:xfrm>
+            <a:prstGeom prst="rect">
+              <a:avLst/>
+            </a:prstGeom>
+            <a:noFill/>
+          </p:spPr>
+          <p:txBody>
+            <a:bodyPr wrap="none" rtlCol="0">
+              <a:spAutoFit/>
+            </a:bodyPr>
+            <a:lstStyle/>
+            <a:p>
+              <a:r>
+                <a:rPr lang="en-US" sz="2000" b="1">
+                  <a:solidFill>
+                    <a:schemeClr val="bg1">
+                      <a:lumMod val="50000"/>
+                    </a:schemeClr>
+                  </a:solidFill>
+                </a:rPr>
+                <a:t>CH7</a:t>
+              </a:r>
+            </a:p>
+          </p:txBody>
+        </p:sp>
+        <p:sp>
+          <p:nvSpPr>
+            <p:cNvPr id="103" name="文本框 102">
+              <a:extLst>
+                <a:ext uri="{FF2B5EF4-FFF2-40B4-BE49-F238E27FC236}">
+                  <a16:creationId xmlns:a16="http://schemas.microsoft.com/office/drawing/2014/main" id="{3343A002-8E5F-49D7-87DF-8F24315AA48D}"/>
+                </a:ext>
+              </a:extLst>
+            </p:cNvPr>
+            <p:cNvSpPr txBox="1"/>
+            <p:nvPr/>
+          </p:nvSpPr>
+          <p:spPr>
+            <a:xfrm>
+              <a:off x="8981402" y="2196527"/>
+              <a:ext cx="612668" cy="400110"/>
+            </a:xfrm>
+            <a:prstGeom prst="rect">
+              <a:avLst/>
+            </a:prstGeom>
+            <a:noFill/>
+          </p:spPr>
+          <p:txBody>
+            <a:bodyPr wrap="none" rtlCol="0">
+              <a:spAutoFit/>
+            </a:bodyPr>
+            <a:lstStyle/>
+            <a:p>
+              <a:r>
+                <a:rPr lang="en-US" sz="2000" b="1">
+                  <a:solidFill>
+                    <a:schemeClr val="bg1">
+                      <a:lumMod val="50000"/>
+                    </a:schemeClr>
+                  </a:solidFill>
+                </a:rPr>
+                <a:t>CH6</a:t>
+              </a:r>
+            </a:p>
+          </p:txBody>
+        </p:sp>
+        <p:sp>
+          <p:nvSpPr>
+            <p:cNvPr id="104" name="文本框 103">
+              <a:extLst>
+                <a:ext uri="{FF2B5EF4-FFF2-40B4-BE49-F238E27FC236}">
+                  <a16:creationId xmlns:a16="http://schemas.microsoft.com/office/drawing/2014/main" id="{0EDCCE3A-EA32-4C2F-BF97-88D7CFB2A140}"/>
+                </a:ext>
+              </a:extLst>
+            </p:cNvPr>
+            <p:cNvSpPr txBox="1"/>
+            <p:nvPr/>
+          </p:nvSpPr>
+          <p:spPr>
+            <a:xfrm>
+              <a:off x="8981402" y="2560042"/>
+              <a:ext cx="612668" cy="400110"/>
+            </a:xfrm>
+            <a:prstGeom prst="rect">
+              <a:avLst/>
+            </a:prstGeom>
+            <a:noFill/>
+          </p:spPr>
+          <p:txBody>
+            <a:bodyPr wrap="none" rtlCol="0">
+              <a:spAutoFit/>
+            </a:bodyPr>
+            <a:lstStyle/>
+            <a:p>
+              <a:r>
+                <a:rPr lang="en-US" sz="2000" b="1">
+                  <a:solidFill>
+                    <a:schemeClr val="bg1">
+                      <a:lumMod val="50000"/>
+                    </a:schemeClr>
+                  </a:solidFill>
+                </a:rPr>
+                <a:t>CH5</a:t>
+              </a:r>
+            </a:p>
+          </p:txBody>
+        </p:sp>
+        <p:sp>
+          <p:nvSpPr>
+            <p:cNvPr id="105" name="文本框 104">
+              <a:extLst>
+                <a:ext uri="{FF2B5EF4-FFF2-40B4-BE49-F238E27FC236}">
+                  <a16:creationId xmlns:a16="http://schemas.microsoft.com/office/drawing/2014/main" id="{246BCC0B-AFA8-445C-ADF0-34520485E434}"/>
+                </a:ext>
+              </a:extLst>
+            </p:cNvPr>
+            <p:cNvSpPr txBox="1"/>
+            <p:nvPr/>
+          </p:nvSpPr>
+          <p:spPr>
+            <a:xfrm>
+              <a:off x="8981402" y="2923556"/>
+              <a:ext cx="612668" cy="400110"/>
+            </a:xfrm>
+            <a:prstGeom prst="rect">
+              <a:avLst/>
+            </a:prstGeom>
+            <a:noFill/>
+          </p:spPr>
+          <p:txBody>
+            <a:bodyPr wrap="none" rtlCol="0">
+              <a:spAutoFit/>
+            </a:bodyPr>
+            <a:lstStyle/>
+            <a:p>
+              <a:r>
+                <a:rPr lang="en-US" sz="2000" b="1">
+                  <a:solidFill>
+                    <a:schemeClr val="bg1">
+                      <a:lumMod val="50000"/>
+                    </a:schemeClr>
+                  </a:solidFill>
+                </a:rPr>
+                <a:t>CH4</a:t>
+              </a:r>
+            </a:p>
+          </p:txBody>
+        </p:sp>
+      </p:grpSp>
+      <p:sp>
+        <p:nvSpPr>
+          <p:cNvPr id="111" name="椭圆 110">
+            <a:extLst>
+              <a:ext uri="{FF2B5EF4-FFF2-40B4-BE49-F238E27FC236}">
+                <a16:creationId xmlns:a16="http://schemas.microsoft.com/office/drawing/2014/main" id="{A947E567-B8C6-4C52-8007-6BAF331D70B9}"/>
+              </a:ext>
+            </a:extLst>
+          </p:cNvPr>
+          <p:cNvSpPr>
+            <a:spLocks noChangeAspect="1"/>
+          </p:cNvSpPr>
+          <p:nvPr/>
+        </p:nvSpPr>
+        <p:spPr>
+          <a:xfrm>
+            <a:off x="8423657" y="2157552"/>
+            <a:ext cx="103124" cy="103124"/>
+          </a:xfrm>
+          <a:prstGeom prst="ellipse">
+            <a:avLst/>
+          </a:prstGeom>
+          <a:solidFill>
+            <a:srgbClr val="FFC000"/>
+          </a:solidFill>
+          <a:ln>
+            <a:solidFill>
+              <a:srgbClr val="FFC000"/>
+            </a:solidFill>
+          </a:ln>
+        </p:spPr>
+        <p:style>
+          <a:lnRef idx="2">
+            <a:schemeClr val="accent1">
+              <a:shade val="50000"/>
+            </a:schemeClr>
+          </a:lnRef>
+          <a:fillRef idx="1">
+            <a:schemeClr val="accent1"/>
+          </a:fillRef>
+          <a:effectRef idx="0">
+            <a:schemeClr val="accent1"/>
+          </a:effectRef>
+          <a:fontRef idx="minor">
+            <a:schemeClr val="lt1"/>
+          </a:fontRef>
+        </p:style>
+        <p:txBody>
+          <a:bodyPr rtlCol="0" anchor="ctr"/>
+          <a:lstStyle/>
+          <a:p>
+            <a:pPr algn="ctr"/>
+            <a:endParaRPr lang="en-US"/>
+          </a:p>
+        </p:txBody>
+      </p:sp>
+      <p:sp>
+        <p:nvSpPr>
+          <p:cNvPr id="112" name="椭圆 111">
+            <a:extLst>
+              <a:ext uri="{FF2B5EF4-FFF2-40B4-BE49-F238E27FC236}">
+                <a16:creationId xmlns:a16="http://schemas.microsoft.com/office/drawing/2014/main" id="{0320A3EC-5D18-49CC-8237-1FE461BC2C08}"/>
+              </a:ext>
+            </a:extLst>
+          </p:cNvPr>
+          <p:cNvSpPr>
+            <a:spLocks noChangeAspect="1"/>
+          </p:cNvSpPr>
+          <p:nvPr/>
+        </p:nvSpPr>
+        <p:spPr>
+          <a:xfrm>
+            <a:off x="8423657" y="2352366"/>
+            <a:ext cx="103124" cy="103124"/>
+          </a:xfrm>
+          <a:prstGeom prst="ellipse">
+            <a:avLst/>
+          </a:prstGeom>
+          <a:solidFill>
+            <a:srgbClr val="FFC000"/>
+          </a:solidFill>
+          <a:ln>
+            <a:solidFill>
+              <a:srgbClr val="FFC000"/>
+            </a:solidFill>
+          </a:ln>
+        </p:spPr>
+        <p:style>
+          <a:lnRef idx="2">
+            <a:schemeClr val="accent1">
+              <a:shade val="50000"/>
+            </a:schemeClr>
+          </a:lnRef>
+          <a:fillRef idx="1">
+            <a:schemeClr val="accent1"/>
+          </a:fillRef>
+          <a:effectRef idx="0">
+            <a:schemeClr val="accent1"/>
+          </a:effectRef>
+          <a:fontRef idx="minor">
+            <a:schemeClr val="lt1"/>
+          </a:fontRef>
+        </p:style>
+        <p:txBody>
+          <a:bodyPr rtlCol="0" anchor="ctr"/>
+          <a:lstStyle/>
+          <a:p>
+            <a:pPr algn="ctr"/>
+            <a:endParaRPr lang="en-US"/>
+          </a:p>
+        </p:txBody>
+      </p:sp>
+      <p:sp>
+        <p:nvSpPr>
+          <p:cNvPr id="113" name="椭圆 112">
+            <a:extLst>
+              <a:ext uri="{FF2B5EF4-FFF2-40B4-BE49-F238E27FC236}">
+                <a16:creationId xmlns:a16="http://schemas.microsoft.com/office/drawing/2014/main" id="{255DFE62-EC78-4FA8-B824-3F97328A08B1}"/>
+              </a:ext>
+            </a:extLst>
+          </p:cNvPr>
+          <p:cNvSpPr>
+            <a:spLocks noChangeAspect="1"/>
+          </p:cNvSpPr>
+          <p:nvPr/>
+        </p:nvSpPr>
+        <p:spPr>
+          <a:xfrm>
+            <a:off x="8423657" y="2547179"/>
+            <a:ext cx="103124" cy="103124"/>
+          </a:xfrm>
+          <a:prstGeom prst="ellipse">
+            <a:avLst/>
+          </a:prstGeom>
+          <a:solidFill>
+            <a:srgbClr val="FFC000"/>
+          </a:solidFill>
+          <a:ln>
+            <a:solidFill>
+              <a:srgbClr val="FFC000"/>
+            </a:solidFill>
+          </a:ln>
+        </p:spPr>
+        <p:style>
+          <a:lnRef idx="2">
+            <a:schemeClr val="accent1">
+              <a:shade val="50000"/>
+            </a:schemeClr>
+          </a:lnRef>
+          <a:fillRef idx="1">
+            <a:schemeClr val="accent1"/>
+          </a:fillRef>
+          <a:effectRef idx="0">
+            <a:schemeClr val="accent1"/>
+          </a:effectRef>
+          <a:fontRef idx="minor">
+            <a:schemeClr val="lt1"/>
+          </a:fontRef>
+        </p:style>
+        <p:txBody>
+          <a:bodyPr rtlCol="0" anchor="ctr"/>
+          <a:lstStyle/>
+          <a:p>
+            <a:pPr algn="ctr"/>
+            <a:endParaRPr lang="en-US"/>
+          </a:p>
+        </p:txBody>
+      </p:sp>
+      <p:sp>
+        <p:nvSpPr>
+          <p:cNvPr id="116" name="椭圆 115">
+            <a:extLst>
+              <a:ext uri="{FF2B5EF4-FFF2-40B4-BE49-F238E27FC236}">
+                <a16:creationId xmlns:a16="http://schemas.microsoft.com/office/drawing/2014/main" id="{0FF84E76-A2EF-445F-B35A-D545DB309750}"/>
+              </a:ext>
+            </a:extLst>
+          </p:cNvPr>
+          <p:cNvSpPr>
+            <a:spLocks noChangeAspect="1"/>
+          </p:cNvSpPr>
+          <p:nvPr/>
+        </p:nvSpPr>
+        <p:spPr>
+          <a:xfrm>
+            <a:off x="8423657" y="2741993"/>
+            <a:ext cx="103124" cy="103124"/>
+          </a:xfrm>
+          <a:prstGeom prst="ellipse">
+            <a:avLst/>
+          </a:prstGeom>
+          <a:solidFill>
+            <a:srgbClr val="FFC000"/>
+          </a:solidFill>
+          <a:ln>
+            <a:solidFill>
+              <a:srgbClr val="FFC000"/>
+            </a:solidFill>
+          </a:ln>
+        </p:spPr>
+        <p:style>
+          <a:lnRef idx="2">
+            <a:schemeClr val="accent1">
+              <a:shade val="50000"/>
+            </a:schemeClr>
+          </a:lnRef>
+          <a:fillRef idx="1">
+            <a:schemeClr val="accent1"/>
+          </a:fillRef>
+          <a:effectRef idx="0">
+            <a:schemeClr val="accent1"/>
+          </a:effectRef>
+          <a:fontRef idx="minor">
+            <a:schemeClr val="lt1"/>
+          </a:fontRef>
+        </p:style>
+        <p:txBody>
+          <a:bodyPr rtlCol="0" anchor="ctr"/>
+          <a:lstStyle/>
+          <a:p>
+            <a:pPr algn="ctr"/>
+            <a:endParaRPr lang="en-US"/>
+          </a:p>
+        </p:txBody>
+      </p:sp>
+      <p:cxnSp>
+        <p:nvCxnSpPr>
+          <p:cNvPr id="118" name="直接连接符 117">
+            <a:extLst>
+              <a:ext uri="{FF2B5EF4-FFF2-40B4-BE49-F238E27FC236}">
+                <a16:creationId xmlns:a16="http://schemas.microsoft.com/office/drawing/2014/main" id="{6A3AD7B7-3FD5-4C67-9D8C-506771E06D4B}"/>
+              </a:ext>
+            </a:extLst>
+          </p:cNvPr>
+          <p:cNvCxnSpPr>
+            <a:cxnSpLocks/>
+            <a:stCxn id="67" idx="6"/>
+            <a:endCxn id="65" idx="1"/>
+          </p:cNvCxnSpPr>
+          <p:nvPr/>
+        </p:nvCxnSpPr>
+        <p:spPr>
+          <a:xfrm flipV="1">
+            <a:off x="8526781" y="1675903"/>
+            <a:ext cx="733742" cy="338397"/>
+          </a:xfrm>
+          <a:prstGeom prst="line">
+            <a:avLst/>
+          </a:prstGeom>
+          <a:ln w="12700">
+            <a:solidFill>
+              <a:schemeClr val="bg1">
+                <a:lumMod val="50000"/>
+              </a:schemeClr>
+            </a:solidFill>
+            <a:prstDash val="dash"/>
+          </a:ln>
+        </p:spPr>
+        <p:style>
+          <a:lnRef idx="1">
+            <a:schemeClr val="accent1"/>
+          </a:lnRef>
+          <a:fillRef idx="0">
+            <a:schemeClr val="accent1"/>
+          </a:fillRef>
+          <a:effectRef idx="0">
+            <a:schemeClr val="accent1"/>
+          </a:effectRef>
+          <a:fontRef idx="minor">
+            <a:schemeClr val="tx1"/>
+          </a:fontRef>
+        </p:style>
+      </p:cxnSp>
+      <p:cxnSp>
+        <p:nvCxnSpPr>
+          <p:cNvPr id="121" name="直接连接符 120">
+            <a:extLst>
+              <a:ext uri="{FF2B5EF4-FFF2-40B4-BE49-F238E27FC236}">
+                <a16:creationId xmlns:a16="http://schemas.microsoft.com/office/drawing/2014/main" id="{5419A3C8-0BE4-4E3F-9627-C5690A0BC284}"/>
+              </a:ext>
+            </a:extLst>
+          </p:cNvPr>
+          <p:cNvCxnSpPr>
+            <a:stCxn id="111" idx="6"/>
+            <a:endCxn id="102" idx="1"/>
+          </p:cNvCxnSpPr>
+          <p:nvPr/>
+        </p:nvCxnSpPr>
+        <p:spPr>
+          <a:xfrm flipV="1">
+            <a:off x="8526781" y="2039418"/>
+            <a:ext cx="733742" cy="169696"/>
+          </a:xfrm>
+          <a:prstGeom prst="line">
+            <a:avLst/>
+          </a:prstGeom>
+          <a:ln w="12700">
+            <a:solidFill>
+              <a:schemeClr val="bg1">
+                <a:lumMod val="50000"/>
+              </a:schemeClr>
+            </a:solidFill>
+            <a:prstDash val="dash"/>
+          </a:ln>
+        </p:spPr>
+        <p:style>
+          <a:lnRef idx="1">
+            <a:schemeClr val="accent1"/>
+          </a:lnRef>
+          <a:fillRef idx="0">
+            <a:schemeClr val="accent1"/>
+          </a:fillRef>
+          <a:effectRef idx="0">
+            <a:schemeClr val="accent1"/>
+          </a:effectRef>
+          <a:fontRef idx="minor">
+            <a:schemeClr val="tx1"/>
+          </a:fontRef>
+        </p:style>
+      </p:cxnSp>
+      <p:cxnSp>
+        <p:nvCxnSpPr>
+          <p:cNvPr id="123" name="直接连接符 122">
+            <a:extLst>
+              <a:ext uri="{FF2B5EF4-FFF2-40B4-BE49-F238E27FC236}">
+                <a16:creationId xmlns:a16="http://schemas.microsoft.com/office/drawing/2014/main" id="{E7E1E291-727F-4AC3-A500-87209472D3A1}"/>
+              </a:ext>
+            </a:extLst>
+          </p:cNvPr>
+          <p:cNvCxnSpPr>
+            <a:stCxn id="112" idx="6"/>
+            <a:endCxn id="103" idx="1"/>
+          </p:cNvCxnSpPr>
+          <p:nvPr/>
+        </p:nvCxnSpPr>
+        <p:spPr>
+          <a:xfrm flipV="1">
+            <a:off x="8526781" y="2402932"/>
+            <a:ext cx="733742" cy="996"/>
+          </a:xfrm>
+          <a:prstGeom prst="line">
+            <a:avLst/>
+          </a:prstGeom>
+          <a:ln w="12700">
+            <a:solidFill>
+              <a:schemeClr val="bg1">
+                <a:lumMod val="50000"/>
+              </a:schemeClr>
+            </a:solidFill>
+            <a:prstDash val="dash"/>
+          </a:ln>
+        </p:spPr>
+        <p:style>
+          <a:lnRef idx="1">
+            <a:schemeClr val="accent1"/>
+          </a:lnRef>
+          <a:fillRef idx="0">
+            <a:schemeClr val="accent1"/>
+          </a:fillRef>
+          <a:effectRef idx="0">
+            <a:schemeClr val="accent1"/>
+          </a:effectRef>
+          <a:fontRef idx="minor">
+            <a:schemeClr val="tx1"/>
+          </a:fontRef>
+        </p:style>
+      </p:cxnSp>
+      <p:cxnSp>
+        <p:nvCxnSpPr>
+          <p:cNvPr id="126" name="直接连接符 125">
+            <a:extLst>
+              <a:ext uri="{FF2B5EF4-FFF2-40B4-BE49-F238E27FC236}">
+                <a16:creationId xmlns:a16="http://schemas.microsoft.com/office/drawing/2014/main" id="{FBD0C722-53B6-4497-A925-4FA854A4B902}"/>
+              </a:ext>
+            </a:extLst>
+          </p:cNvPr>
+          <p:cNvCxnSpPr>
+            <a:cxnSpLocks/>
+            <a:stCxn id="113" idx="6"/>
+            <a:endCxn id="104" idx="1"/>
+          </p:cNvCxnSpPr>
+          <p:nvPr/>
+        </p:nvCxnSpPr>
+        <p:spPr>
+          <a:xfrm>
+            <a:off x="8526781" y="2598741"/>
+            <a:ext cx="733742" cy="167706"/>
+          </a:xfrm>
+          <a:prstGeom prst="line">
+            <a:avLst/>
+          </a:prstGeom>
+          <a:ln w="12700">
+            <a:solidFill>
+              <a:schemeClr val="bg1">
+                <a:lumMod val="50000"/>
+              </a:schemeClr>
+            </a:solidFill>
+            <a:prstDash val="dash"/>
+          </a:ln>
+        </p:spPr>
+        <p:style>
+          <a:lnRef idx="1">
+            <a:schemeClr val="accent1"/>
+          </a:lnRef>
+          <a:fillRef idx="0">
+            <a:schemeClr val="accent1"/>
+          </a:fillRef>
+          <a:effectRef idx="0">
+            <a:schemeClr val="accent1"/>
+          </a:effectRef>
+          <a:fontRef idx="minor">
+            <a:schemeClr val="tx1"/>
+          </a:fontRef>
+        </p:style>
+      </p:cxnSp>
+      <p:cxnSp>
+        <p:nvCxnSpPr>
+          <p:cNvPr id="128" name="直接连接符 127">
+            <a:extLst>
+              <a:ext uri="{FF2B5EF4-FFF2-40B4-BE49-F238E27FC236}">
+                <a16:creationId xmlns:a16="http://schemas.microsoft.com/office/drawing/2014/main" id="{24146B3C-3AFD-4357-A3AC-67523F962256}"/>
+              </a:ext>
+            </a:extLst>
+          </p:cNvPr>
+          <p:cNvCxnSpPr>
+            <a:stCxn id="116" idx="6"/>
+            <a:endCxn id="105" idx="1"/>
+          </p:cNvCxnSpPr>
+          <p:nvPr/>
+        </p:nvCxnSpPr>
+        <p:spPr>
+          <a:xfrm>
+            <a:off x="8526781" y="2793555"/>
+            <a:ext cx="733742" cy="336406"/>
+          </a:xfrm>
+          <a:prstGeom prst="line">
+            <a:avLst/>
+          </a:prstGeom>
+          <a:ln w="12700">
+            <a:solidFill>
+              <a:schemeClr val="bg1">
+                <a:lumMod val="50000"/>
+              </a:schemeClr>
+            </a:solidFill>
+            <a:prstDash val="dash"/>
+          </a:ln>
+        </p:spPr>
+        <p:style>
+          <a:lnRef idx="1">
+            <a:schemeClr val="accent1"/>
+          </a:lnRef>
+          <a:fillRef idx="0">
+            <a:schemeClr val="accent1"/>
+          </a:fillRef>
+          <a:effectRef idx="0">
+            <a:schemeClr val="accent1"/>
+          </a:effectRef>
+          <a:fontRef idx="minor">
+            <a:schemeClr val="tx1"/>
+          </a:fontRef>
+        </p:style>
+      </p:cxnSp>
+    </p:spTree>
+    <p:extLst>
+      <p:ext uri="{BB962C8B-B14F-4D97-AF65-F5344CB8AC3E}">
+        <p14:creationId xmlns:p14="http://schemas.microsoft.com/office/powerpoint/2010/main" val="364109396"/>
+      </p:ext>
+    </p:extLst>
+  </p:cSld>
+  <p:clrMapOvr>
+    <a:masterClrMapping/>
+  </p:clrMapOvr>
+</p:sld>
+</file>
+
+<file path=ppt/slides/slide4.xml><?xml version="1.0" encoding="utf-8"?>
+<p:sld xmlns:a="http://schemas.openxmlformats.org/drawingml/2006/main" xmlns:r="http://schemas.openxmlformats.org/officeDocument/2006/relationships" xmlns:p="http://schemas.openxmlformats.org/presentationml/2006/main">
+  <p:cSld>
+    <p:spTree>
+      <p:nvGrpSpPr>
+        <p:cNvPr id="1" name=""/>
+        <p:cNvGrpSpPr/>
+        <p:nvPr/>
+      </p:nvGrpSpPr>
+      <p:grpSpPr>
+        <a:xfrm>
+          <a:off x="0" y="0"/>
+          <a:ext cx="0" cy="0"/>
+          <a:chOff x="0" y="0"/>
+          <a:chExt cx="0" cy="0"/>
+        </a:xfrm>
+      </p:grpSpPr>
+      <p:pic>
+        <p:nvPicPr>
+          <p:cNvPr id="3" name="图片 2">
+            <a:extLst>
+              <a:ext uri="{FF2B5EF4-FFF2-40B4-BE49-F238E27FC236}">
+                <a16:creationId xmlns:a16="http://schemas.microsoft.com/office/drawing/2014/main" id="{A718CE8A-AED6-4D77-9BA1-492F8B2979E3}"/>
+              </a:ext>
+            </a:extLst>
+          </p:cNvPr>
+          <p:cNvPicPr>
+            <a:picLocks noChangeAspect="1"/>
+          </p:cNvPicPr>
+          <p:nvPr/>
+        </p:nvPicPr>
+        <p:blipFill>
+          <a:blip r:embed="rId2">
+            <a:extLst>
+              <a:ext uri="{28A0092B-C50C-407E-A947-70E740481C1C}">
+                <a14:useLocalDpi xmlns:a14="http://schemas.microsoft.com/office/drawing/2010/main" val="0"/>
+              </a:ext>
+            </a:extLst>
+          </a:blip>
+          <a:stretch>
+            <a:fillRect/>
+          </a:stretch>
+        </p:blipFill>
+        <p:spPr>
+          <a:xfrm>
+            <a:off x="3134941" y="-57802"/>
+            <a:ext cx="6223000" cy="4667250"/>
+          </a:xfrm>
+          <a:prstGeom prst="rect">
+            <a:avLst/>
+          </a:prstGeom>
+        </p:spPr>
+      </p:pic>
+      <p:sp>
+        <p:nvSpPr>
+          <p:cNvPr id="11" name="矩形 10">
+            <a:extLst>
+              <a:ext uri="{FF2B5EF4-FFF2-40B4-BE49-F238E27FC236}">
+                <a16:creationId xmlns:a16="http://schemas.microsoft.com/office/drawing/2014/main" id="{E7DEEE3A-B241-4860-AE77-59AD803ED9F6}"/>
+              </a:ext>
+            </a:extLst>
+          </p:cNvPr>
+          <p:cNvSpPr/>
+          <p:nvPr/>
+        </p:nvSpPr>
+        <p:spPr>
+          <a:xfrm>
+            <a:off x="3293811" y="4246880"/>
+            <a:ext cx="466236" cy="423761"/>
+          </a:xfrm>
+          <a:prstGeom prst="rect">
+            <a:avLst/>
+          </a:prstGeom>
+          <a:solidFill>
+            <a:schemeClr val="bg2">
+              <a:lumMod val="50000"/>
+            </a:schemeClr>
+          </a:solidFill>
+          <a:ln>
+            <a:solidFill>
+              <a:schemeClr val="bg2">
+                <a:lumMod val="50000"/>
+              </a:schemeClr>
+            </a:solidFill>
+          </a:ln>
+        </p:spPr>
+        <p:style>
+          <a:lnRef idx="2">
+            <a:schemeClr val="accent1">
+              <a:shade val="50000"/>
+            </a:schemeClr>
+          </a:lnRef>
+          <a:fillRef idx="1">
+            <a:schemeClr val="accent1"/>
+          </a:fillRef>
+          <a:effectRef idx="0">
+            <a:schemeClr val="accent1"/>
+          </a:effectRef>
+          <a:fontRef idx="minor">
+            <a:schemeClr val="lt1"/>
+          </a:fontRef>
+        </p:style>
+        <p:txBody>
+          <a:bodyPr rtlCol="0" anchor="ctr"/>
+          <a:lstStyle/>
+          <a:p>
+            <a:pPr algn="ctr"/>
+            <a:endParaRPr lang="en-US"/>
+          </a:p>
+        </p:txBody>
+      </p:sp>
+      <p:sp>
+        <p:nvSpPr>
+          <p:cNvPr id="36" name="矩形 35">
+            <a:extLst>
+              <a:ext uri="{FF2B5EF4-FFF2-40B4-BE49-F238E27FC236}">
+                <a16:creationId xmlns:a16="http://schemas.microsoft.com/office/drawing/2014/main" id="{A96F62E8-5406-4873-816E-F09EC10BE688}"/>
+              </a:ext>
+            </a:extLst>
+          </p:cNvPr>
+          <p:cNvSpPr/>
+          <p:nvPr/>
+        </p:nvSpPr>
+        <p:spPr>
+          <a:xfrm>
+            <a:off x="3293811" y="4849649"/>
+            <a:ext cx="466236" cy="423761"/>
+          </a:xfrm>
+          <a:prstGeom prst="rect">
+            <a:avLst/>
+          </a:prstGeom>
+          <a:solidFill>
+            <a:schemeClr val="bg2">
+              <a:lumMod val="50000"/>
+            </a:schemeClr>
+          </a:solidFill>
+          <a:ln>
+            <a:solidFill>
+              <a:schemeClr val="bg2">
+                <a:lumMod val="50000"/>
+              </a:schemeClr>
+            </a:solidFill>
+          </a:ln>
+        </p:spPr>
+        <p:style>
+          <a:lnRef idx="2">
+            <a:schemeClr val="accent1">
+              <a:shade val="50000"/>
+            </a:schemeClr>
+          </a:lnRef>
+          <a:fillRef idx="1">
+            <a:schemeClr val="accent1"/>
+          </a:fillRef>
+          <a:effectRef idx="0">
+            <a:schemeClr val="accent1"/>
+          </a:effectRef>
+          <a:fontRef idx="minor">
+            <a:schemeClr val="lt1"/>
+          </a:fontRef>
+        </p:style>
+        <p:txBody>
+          <a:bodyPr rtlCol="0" anchor="ctr"/>
+          <a:lstStyle/>
+          <a:p>
+            <a:pPr algn="ctr"/>
+            <a:endParaRPr lang="en-US"/>
+          </a:p>
+        </p:txBody>
+      </p:sp>
+      <p:sp>
+        <p:nvSpPr>
+          <p:cNvPr id="37" name="矩形 36">
+            <a:extLst>
+              <a:ext uri="{FF2B5EF4-FFF2-40B4-BE49-F238E27FC236}">
+                <a16:creationId xmlns:a16="http://schemas.microsoft.com/office/drawing/2014/main" id="{619560A3-083F-41D7-A991-168D2F531566}"/>
+              </a:ext>
+            </a:extLst>
+          </p:cNvPr>
+          <p:cNvSpPr/>
+          <p:nvPr/>
+        </p:nvSpPr>
+        <p:spPr>
+          <a:xfrm>
+            <a:off x="3293811" y="5452418"/>
+            <a:ext cx="466236" cy="423761"/>
+          </a:xfrm>
+          <a:prstGeom prst="rect">
+            <a:avLst/>
+          </a:prstGeom>
+          <a:solidFill>
+            <a:schemeClr val="bg2">
+              <a:lumMod val="50000"/>
+            </a:schemeClr>
+          </a:solidFill>
+          <a:ln>
+            <a:solidFill>
+              <a:schemeClr val="bg2">
+                <a:lumMod val="50000"/>
+              </a:schemeClr>
+            </a:solidFill>
+          </a:ln>
+        </p:spPr>
+        <p:style>
+          <a:lnRef idx="2">
+            <a:schemeClr val="accent1">
+              <a:shade val="50000"/>
+            </a:schemeClr>
+          </a:lnRef>
+          <a:fillRef idx="1">
+            <a:schemeClr val="accent1"/>
+          </a:fillRef>
+          <a:effectRef idx="0">
+            <a:schemeClr val="accent1"/>
+          </a:effectRef>
+          <a:fontRef idx="minor">
+            <a:schemeClr val="lt1"/>
+          </a:fontRef>
+        </p:style>
+        <p:txBody>
+          <a:bodyPr rtlCol="0" anchor="ctr"/>
+          <a:lstStyle/>
+          <a:p>
+            <a:pPr algn="ctr"/>
+            <a:endParaRPr lang="en-US"/>
+          </a:p>
+        </p:txBody>
+      </p:sp>
+      <p:sp>
+        <p:nvSpPr>
+          <p:cNvPr id="38" name="矩形 37">
+            <a:extLst>
+              <a:ext uri="{FF2B5EF4-FFF2-40B4-BE49-F238E27FC236}">
+                <a16:creationId xmlns:a16="http://schemas.microsoft.com/office/drawing/2014/main" id="{7263E8A4-AAFA-4DE8-AFFF-74FF843FBE3A}"/>
+              </a:ext>
+            </a:extLst>
+          </p:cNvPr>
+          <p:cNvSpPr/>
+          <p:nvPr/>
+        </p:nvSpPr>
+        <p:spPr>
+          <a:xfrm>
+            <a:off x="3986681" y="4849649"/>
+            <a:ext cx="466236" cy="423761"/>
+          </a:xfrm>
+          <a:prstGeom prst="rect">
+            <a:avLst/>
+          </a:prstGeom>
+          <a:solidFill>
+            <a:schemeClr val="bg2">
+              <a:lumMod val="50000"/>
+            </a:schemeClr>
+          </a:solidFill>
+          <a:ln>
+            <a:solidFill>
+              <a:schemeClr val="bg2">
+                <a:lumMod val="50000"/>
+              </a:schemeClr>
+            </a:solidFill>
+          </a:ln>
+        </p:spPr>
+        <p:style>
+          <a:lnRef idx="2">
+            <a:schemeClr val="accent1">
+              <a:shade val="50000"/>
+            </a:schemeClr>
+          </a:lnRef>
+          <a:fillRef idx="1">
+            <a:schemeClr val="accent1"/>
+          </a:fillRef>
+          <a:effectRef idx="0">
+            <a:schemeClr val="accent1"/>
+          </a:effectRef>
+          <a:fontRef idx="minor">
+            <a:schemeClr val="lt1"/>
+          </a:fontRef>
+        </p:style>
+        <p:txBody>
+          <a:bodyPr rtlCol="0" anchor="ctr"/>
+          <a:lstStyle/>
+          <a:p>
+            <a:pPr algn="ctr"/>
+            <a:endParaRPr lang="en-US"/>
+          </a:p>
+        </p:txBody>
+      </p:sp>
+      <p:sp>
+        <p:nvSpPr>
+          <p:cNvPr id="5" name="矩形 4">
+            <a:extLst>
+              <a:ext uri="{FF2B5EF4-FFF2-40B4-BE49-F238E27FC236}">
+                <a16:creationId xmlns:a16="http://schemas.microsoft.com/office/drawing/2014/main" id="{E6C472E4-E057-478C-9933-0CCCBED073A1}"/>
+              </a:ext>
+            </a:extLst>
+          </p:cNvPr>
+          <p:cNvSpPr/>
+          <p:nvPr/>
+        </p:nvSpPr>
+        <p:spPr>
+          <a:xfrm>
+            <a:off x="3434968" y="5151034"/>
+            <a:ext cx="183921" cy="423761"/>
+          </a:xfrm>
+          <a:prstGeom prst="rect">
+            <a:avLst/>
+          </a:prstGeom>
+          <a:solidFill>
+            <a:schemeClr val="bg2">
+              <a:lumMod val="50000"/>
+            </a:schemeClr>
+          </a:solidFill>
+          <a:ln>
+            <a:solidFill>
+              <a:schemeClr val="bg2">
+                <a:lumMod val="50000"/>
+              </a:schemeClr>
+            </a:solidFill>
+          </a:ln>
+        </p:spPr>
+        <p:style>
+          <a:lnRef idx="2">
+            <a:schemeClr val="accent1">
+              <a:shade val="50000"/>
+            </a:schemeClr>
+          </a:lnRef>
+          <a:fillRef idx="1">
+            <a:schemeClr val="accent1"/>
+          </a:fillRef>
+          <a:effectRef idx="0">
+            <a:schemeClr val="accent1"/>
+          </a:effectRef>
+          <a:fontRef idx="minor">
+            <a:schemeClr val="lt1"/>
+          </a:fontRef>
+        </p:style>
+        <p:txBody>
+          <a:bodyPr rtlCol="0" anchor="ctr"/>
+          <a:lstStyle/>
+          <a:p>
+            <a:pPr algn="ctr"/>
+            <a:endParaRPr lang="en-US"/>
+          </a:p>
+        </p:txBody>
+      </p:sp>
+      <p:sp>
+        <p:nvSpPr>
+          <p:cNvPr id="24" name="矩形 23">
+            <a:extLst>
+              <a:ext uri="{FF2B5EF4-FFF2-40B4-BE49-F238E27FC236}">
+                <a16:creationId xmlns:a16="http://schemas.microsoft.com/office/drawing/2014/main" id="{E3333F90-31A4-4061-87D0-5C941E83B6E8}"/>
+              </a:ext>
+            </a:extLst>
+          </p:cNvPr>
+          <p:cNvSpPr/>
+          <p:nvPr/>
+        </p:nvSpPr>
+        <p:spPr>
+          <a:xfrm>
+            <a:off x="5862882" y="4246880"/>
+            <a:ext cx="466236" cy="423761"/>
+          </a:xfrm>
+          <a:prstGeom prst="rect">
+            <a:avLst/>
+          </a:prstGeom>
+          <a:solidFill>
+            <a:schemeClr val="bg2">
+              <a:lumMod val="50000"/>
+            </a:schemeClr>
+          </a:solidFill>
+          <a:ln>
+            <a:solidFill>
+              <a:schemeClr val="bg2">
+                <a:lumMod val="50000"/>
+              </a:schemeClr>
+            </a:solidFill>
+          </a:ln>
+        </p:spPr>
+        <p:style>
+          <a:lnRef idx="2">
+            <a:schemeClr val="accent1">
+              <a:shade val="50000"/>
+            </a:schemeClr>
+          </a:lnRef>
+          <a:fillRef idx="1">
+            <a:schemeClr val="accent1"/>
+          </a:fillRef>
+          <a:effectRef idx="0">
+            <a:schemeClr val="accent1"/>
+          </a:effectRef>
+          <a:fontRef idx="minor">
+            <a:schemeClr val="lt1"/>
+          </a:fontRef>
+        </p:style>
+        <p:txBody>
+          <a:bodyPr rtlCol="0" anchor="ctr"/>
+          <a:lstStyle/>
+          <a:p>
+            <a:pPr algn="ctr"/>
+            <a:endParaRPr lang="en-US"/>
+          </a:p>
+        </p:txBody>
+      </p:sp>
+      <p:sp>
+        <p:nvSpPr>
+          <p:cNvPr id="25" name="矩形 24">
+            <a:extLst>
+              <a:ext uri="{FF2B5EF4-FFF2-40B4-BE49-F238E27FC236}">
+                <a16:creationId xmlns:a16="http://schemas.microsoft.com/office/drawing/2014/main" id="{A6659DB2-2CBE-4614-81F1-0B6AE0DAA2A9}"/>
+              </a:ext>
+            </a:extLst>
+          </p:cNvPr>
+          <p:cNvSpPr/>
+          <p:nvPr/>
+        </p:nvSpPr>
+        <p:spPr>
+          <a:xfrm>
+            <a:off x="5862882" y="4849649"/>
+            <a:ext cx="466236" cy="423761"/>
+          </a:xfrm>
+          <a:prstGeom prst="rect">
+            <a:avLst/>
+          </a:prstGeom>
+          <a:solidFill>
+            <a:schemeClr val="bg2">
+              <a:lumMod val="50000"/>
+            </a:schemeClr>
+          </a:solidFill>
+          <a:ln>
+            <a:solidFill>
+              <a:schemeClr val="bg2">
+                <a:lumMod val="50000"/>
+              </a:schemeClr>
+            </a:solidFill>
+          </a:ln>
+        </p:spPr>
+        <p:style>
+          <a:lnRef idx="2">
+            <a:schemeClr val="accent1">
+              <a:shade val="50000"/>
+            </a:schemeClr>
+          </a:lnRef>
+          <a:fillRef idx="1">
+            <a:schemeClr val="accent1"/>
+          </a:fillRef>
+          <a:effectRef idx="0">
+            <a:schemeClr val="accent1"/>
+          </a:effectRef>
+          <a:fontRef idx="minor">
+            <a:schemeClr val="lt1"/>
+          </a:fontRef>
+        </p:style>
+        <p:txBody>
+          <a:bodyPr rtlCol="0" anchor="ctr"/>
+          <a:lstStyle/>
+          <a:p>
+            <a:pPr algn="ctr"/>
+            <a:endParaRPr lang="en-US"/>
+          </a:p>
+        </p:txBody>
+      </p:sp>
+      <p:sp>
+        <p:nvSpPr>
+          <p:cNvPr id="26" name="矩形 25">
+            <a:extLst>
+              <a:ext uri="{FF2B5EF4-FFF2-40B4-BE49-F238E27FC236}">
+                <a16:creationId xmlns:a16="http://schemas.microsoft.com/office/drawing/2014/main" id="{5281D2F7-333F-4F41-A402-937914D99C93}"/>
+              </a:ext>
+            </a:extLst>
+          </p:cNvPr>
+          <p:cNvSpPr/>
+          <p:nvPr/>
+        </p:nvSpPr>
+        <p:spPr>
+          <a:xfrm>
+            <a:off x="5862882" y="5452418"/>
+            <a:ext cx="466236" cy="423761"/>
+          </a:xfrm>
+          <a:prstGeom prst="rect">
+            <a:avLst/>
+          </a:prstGeom>
+          <a:solidFill>
+            <a:schemeClr val="bg2">
+              <a:lumMod val="50000"/>
+            </a:schemeClr>
+          </a:solidFill>
+          <a:ln>
+            <a:solidFill>
+              <a:schemeClr val="bg2">
+                <a:lumMod val="50000"/>
+              </a:schemeClr>
+            </a:solidFill>
+          </a:ln>
+        </p:spPr>
+        <p:style>
+          <a:lnRef idx="2">
+            <a:schemeClr val="accent1">
+              <a:shade val="50000"/>
+            </a:schemeClr>
+          </a:lnRef>
+          <a:fillRef idx="1">
+            <a:schemeClr val="accent1"/>
+          </a:fillRef>
+          <a:effectRef idx="0">
+            <a:schemeClr val="accent1"/>
+          </a:effectRef>
+          <a:fontRef idx="minor">
+            <a:schemeClr val="lt1"/>
+          </a:fontRef>
+        </p:style>
+        <p:txBody>
+          <a:bodyPr rtlCol="0" anchor="ctr"/>
+          <a:lstStyle/>
+          <a:p>
+            <a:pPr algn="ctr"/>
+            <a:endParaRPr lang="en-US"/>
+          </a:p>
+        </p:txBody>
+      </p:sp>
+      <p:sp>
+        <p:nvSpPr>
+          <p:cNvPr id="27" name="矩形 26">
+            <a:extLst>
+              <a:ext uri="{FF2B5EF4-FFF2-40B4-BE49-F238E27FC236}">
+                <a16:creationId xmlns:a16="http://schemas.microsoft.com/office/drawing/2014/main" id="{9A6637DF-EEE7-4732-81C7-2D9DB46ABA32}"/>
+              </a:ext>
+            </a:extLst>
+          </p:cNvPr>
+          <p:cNvSpPr/>
+          <p:nvPr/>
+        </p:nvSpPr>
+        <p:spPr>
+          <a:xfrm>
+            <a:off x="6555752" y="4849649"/>
+            <a:ext cx="466236" cy="423761"/>
+          </a:xfrm>
+          <a:prstGeom prst="rect">
+            <a:avLst/>
+          </a:prstGeom>
+          <a:solidFill>
+            <a:schemeClr val="bg2">
+              <a:lumMod val="50000"/>
+            </a:schemeClr>
+          </a:solidFill>
+          <a:ln>
+            <a:solidFill>
+              <a:schemeClr val="bg2">
+                <a:lumMod val="50000"/>
+              </a:schemeClr>
+            </a:solidFill>
+          </a:ln>
+        </p:spPr>
+        <p:style>
+          <a:lnRef idx="2">
+            <a:schemeClr val="accent1">
+              <a:shade val="50000"/>
+            </a:schemeClr>
+          </a:lnRef>
+          <a:fillRef idx="1">
+            <a:schemeClr val="accent1"/>
+          </a:fillRef>
+          <a:effectRef idx="0">
+            <a:schemeClr val="accent1"/>
+          </a:effectRef>
+          <a:fontRef idx="minor">
+            <a:schemeClr val="lt1"/>
+          </a:fontRef>
+        </p:style>
+        <p:txBody>
+          <a:bodyPr rtlCol="0" anchor="ctr"/>
+          <a:lstStyle/>
+          <a:p>
+            <a:pPr algn="ctr"/>
+            <a:endParaRPr lang="en-US"/>
+          </a:p>
+        </p:txBody>
+      </p:sp>
+      <p:sp>
+        <p:nvSpPr>
+          <p:cNvPr id="28" name="矩形 27">
+            <a:extLst>
+              <a:ext uri="{FF2B5EF4-FFF2-40B4-BE49-F238E27FC236}">
+                <a16:creationId xmlns:a16="http://schemas.microsoft.com/office/drawing/2014/main" id="{C7113FF0-FBD1-43E6-BC34-CE8339807F9A}"/>
+              </a:ext>
+            </a:extLst>
+          </p:cNvPr>
+          <p:cNvSpPr/>
+          <p:nvPr/>
+        </p:nvSpPr>
+        <p:spPr>
+          <a:xfrm rot="5400000">
+            <a:off x="6350475" y="4855487"/>
+            <a:ext cx="183921" cy="423761"/>
+          </a:xfrm>
+          <a:prstGeom prst="rect">
+            <a:avLst/>
+          </a:prstGeom>
+          <a:solidFill>
+            <a:schemeClr val="bg2">
+              <a:lumMod val="50000"/>
+            </a:schemeClr>
+          </a:solidFill>
+          <a:ln>
+            <a:solidFill>
+              <a:schemeClr val="bg2">
+                <a:lumMod val="50000"/>
+              </a:schemeClr>
+            </a:solidFill>
+          </a:ln>
+        </p:spPr>
+        <p:style>
+          <a:lnRef idx="2">
+            <a:schemeClr val="accent1">
+              <a:shade val="50000"/>
+            </a:schemeClr>
+          </a:lnRef>
+          <a:fillRef idx="1">
+            <a:schemeClr val="accent1"/>
+          </a:fillRef>
+          <a:effectRef idx="0">
+            <a:schemeClr val="accent1"/>
+          </a:effectRef>
+          <a:fontRef idx="minor">
+            <a:schemeClr val="lt1"/>
+          </a:fontRef>
+        </p:style>
+        <p:txBody>
+          <a:bodyPr rtlCol="0" anchor="ctr"/>
+          <a:lstStyle/>
+          <a:p>
+            <a:pPr algn="ctr"/>
+            <a:endParaRPr lang="en-US"/>
+          </a:p>
+        </p:txBody>
+      </p:sp>
+      <p:sp>
+        <p:nvSpPr>
+          <p:cNvPr id="29" name="矩形 28">
+            <a:extLst>
+              <a:ext uri="{FF2B5EF4-FFF2-40B4-BE49-F238E27FC236}">
+                <a16:creationId xmlns:a16="http://schemas.microsoft.com/office/drawing/2014/main" id="{409125DD-F9C3-4B3F-9FEE-593913957053}"/>
+              </a:ext>
+            </a:extLst>
+          </p:cNvPr>
+          <p:cNvSpPr/>
+          <p:nvPr/>
+        </p:nvSpPr>
+        <p:spPr>
+          <a:xfrm>
+            <a:off x="8431953" y="4246880"/>
+            <a:ext cx="466236" cy="423761"/>
+          </a:xfrm>
+          <a:prstGeom prst="rect">
+            <a:avLst/>
+          </a:prstGeom>
+          <a:solidFill>
+            <a:schemeClr val="bg2">
+              <a:lumMod val="50000"/>
+            </a:schemeClr>
+          </a:solidFill>
+          <a:ln>
+            <a:solidFill>
+              <a:schemeClr val="bg2">
+                <a:lumMod val="50000"/>
+              </a:schemeClr>
+            </a:solidFill>
+          </a:ln>
+        </p:spPr>
+        <p:style>
+          <a:lnRef idx="2">
+            <a:schemeClr val="accent1">
+              <a:shade val="50000"/>
+            </a:schemeClr>
+          </a:lnRef>
+          <a:fillRef idx="1">
+            <a:schemeClr val="accent1"/>
+          </a:fillRef>
+          <a:effectRef idx="0">
+            <a:schemeClr val="accent1"/>
+          </a:effectRef>
+          <a:fontRef idx="minor">
+            <a:schemeClr val="lt1"/>
+          </a:fontRef>
+        </p:style>
+        <p:txBody>
+          <a:bodyPr rtlCol="0" anchor="ctr"/>
+          <a:lstStyle/>
+          <a:p>
+            <a:pPr algn="ctr"/>
+            <a:endParaRPr lang="en-US"/>
+          </a:p>
+        </p:txBody>
+      </p:sp>
+      <p:sp>
+        <p:nvSpPr>
+          <p:cNvPr id="30" name="矩形 29">
+            <a:extLst>
+              <a:ext uri="{FF2B5EF4-FFF2-40B4-BE49-F238E27FC236}">
+                <a16:creationId xmlns:a16="http://schemas.microsoft.com/office/drawing/2014/main" id="{EB835B1D-5A05-4E69-B3F5-219F07762680}"/>
+              </a:ext>
+            </a:extLst>
+          </p:cNvPr>
+          <p:cNvSpPr/>
+          <p:nvPr/>
+        </p:nvSpPr>
+        <p:spPr>
+          <a:xfrm>
+            <a:off x="8431953" y="4849649"/>
+            <a:ext cx="466236" cy="423761"/>
+          </a:xfrm>
+          <a:prstGeom prst="rect">
+            <a:avLst/>
+          </a:prstGeom>
+          <a:solidFill>
+            <a:schemeClr val="bg2">
+              <a:lumMod val="50000"/>
+            </a:schemeClr>
+          </a:solidFill>
+          <a:ln>
+            <a:solidFill>
+              <a:schemeClr val="bg2">
+                <a:lumMod val="50000"/>
+              </a:schemeClr>
+            </a:solidFill>
+          </a:ln>
+        </p:spPr>
+        <p:style>
+          <a:lnRef idx="2">
+            <a:schemeClr val="accent1">
+              <a:shade val="50000"/>
+            </a:schemeClr>
+          </a:lnRef>
+          <a:fillRef idx="1">
+            <a:schemeClr val="accent1"/>
+          </a:fillRef>
+          <a:effectRef idx="0">
+            <a:schemeClr val="accent1"/>
+          </a:effectRef>
+          <a:fontRef idx="minor">
+            <a:schemeClr val="lt1"/>
+          </a:fontRef>
+        </p:style>
+        <p:txBody>
+          <a:bodyPr rtlCol="0" anchor="ctr"/>
+          <a:lstStyle/>
+          <a:p>
+            <a:pPr algn="ctr"/>
+            <a:endParaRPr lang="en-US"/>
+          </a:p>
+        </p:txBody>
+      </p:sp>
+      <p:sp>
+        <p:nvSpPr>
+          <p:cNvPr id="31" name="矩形 30">
+            <a:extLst>
+              <a:ext uri="{FF2B5EF4-FFF2-40B4-BE49-F238E27FC236}">
+                <a16:creationId xmlns:a16="http://schemas.microsoft.com/office/drawing/2014/main" id="{1CB1B7FF-076C-4C95-8AFB-54FB89EAB17A}"/>
+              </a:ext>
+            </a:extLst>
+          </p:cNvPr>
+          <p:cNvSpPr/>
+          <p:nvPr/>
+        </p:nvSpPr>
+        <p:spPr>
+          <a:xfrm>
+            <a:off x="8431953" y="5452418"/>
+            <a:ext cx="466236" cy="423761"/>
+          </a:xfrm>
+          <a:prstGeom prst="rect">
+            <a:avLst/>
+          </a:prstGeom>
+          <a:solidFill>
+            <a:schemeClr val="bg2">
+              <a:lumMod val="50000"/>
+            </a:schemeClr>
+          </a:solidFill>
+          <a:ln>
+            <a:solidFill>
+              <a:schemeClr val="bg2">
+                <a:lumMod val="50000"/>
+              </a:schemeClr>
+            </a:solidFill>
+          </a:ln>
+        </p:spPr>
+        <p:style>
+          <a:lnRef idx="2">
+            <a:schemeClr val="accent1">
+              <a:shade val="50000"/>
+            </a:schemeClr>
+          </a:lnRef>
+          <a:fillRef idx="1">
+            <a:schemeClr val="accent1"/>
+          </a:fillRef>
+          <a:effectRef idx="0">
+            <a:schemeClr val="accent1"/>
+          </a:effectRef>
+          <a:fontRef idx="minor">
+            <a:schemeClr val="lt1"/>
+          </a:fontRef>
+        </p:style>
+        <p:txBody>
+          <a:bodyPr rtlCol="0" anchor="ctr"/>
+          <a:lstStyle/>
+          <a:p>
+            <a:pPr algn="ctr"/>
+            <a:endParaRPr lang="en-US"/>
+          </a:p>
+        </p:txBody>
+      </p:sp>
+      <p:sp>
+        <p:nvSpPr>
+          <p:cNvPr id="32" name="矩形 31">
+            <a:extLst>
+              <a:ext uri="{FF2B5EF4-FFF2-40B4-BE49-F238E27FC236}">
+                <a16:creationId xmlns:a16="http://schemas.microsoft.com/office/drawing/2014/main" id="{60BFBAA1-32C2-4C4A-9AF7-269097A1A75D}"/>
+              </a:ext>
+            </a:extLst>
+          </p:cNvPr>
+          <p:cNvSpPr/>
+          <p:nvPr/>
+        </p:nvSpPr>
+        <p:spPr>
+          <a:xfrm>
+            <a:off x="9124823" y="4849649"/>
+            <a:ext cx="466236" cy="423761"/>
+          </a:xfrm>
+          <a:prstGeom prst="rect">
+            <a:avLst/>
+          </a:prstGeom>
+          <a:solidFill>
+            <a:schemeClr val="bg2">
+              <a:lumMod val="50000"/>
+            </a:schemeClr>
+          </a:solidFill>
+          <a:ln>
+            <a:solidFill>
+              <a:schemeClr val="bg2">
+                <a:lumMod val="50000"/>
+              </a:schemeClr>
+            </a:solidFill>
+          </a:ln>
+        </p:spPr>
+        <p:style>
+          <a:lnRef idx="2">
+            <a:schemeClr val="accent1">
+              <a:shade val="50000"/>
+            </a:schemeClr>
+          </a:lnRef>
+          <a:fillRef idx="1">
+            <a:schemeClr val="accent1"/>
+          </a:fillRef>
+          <a:effectRef idx="0">
+            <a:schemeClr val="accent1"/>
+          </a:effectRef>
+          <a:fontRef idx="minor">
+            <a:schemeClr val="lt1"/>
+          </a:fontRef>
+        </p:style>
+        <p:txBody>
+          <a:bodyPr rtlCol="0" anchor="ctr"/>
+          <a:lstStyle/>
+          <a:p>
+            <a:pPr algn="ctr"/>
+            <a:endParaRPr lang="en-US"/>
+          </a:p>
+        </p:txBody>
+      </p:sp>
+      <p:sp>
+        <p:nvSpPr>
+          <p:cNvPr id="33" name="矩形 32">
+            <a:extLst>
+              <a:ext uri="{FF2B5EF4-FFF2-40B4-BE49-F238E27FC236}">
+                <a16:creationId xmlns:a16="http://schemas.microsoft.com/office/drawing/2014/main" id="{3BE2D6DB-0A53-4E6B-8673-997E8F9DE7D4}"/>
+              </a:ext>
+            </a:extLst>
+          </p:cNvPr>
+          <p:cNvSpPr/>
+          <p:nvPr/>
+        </p:nvSpPr>
+        <p:spPr>
+          <a:xfrm>
+            <a:off x="8573230" y="4609448"/>
+            <a:ext cx="183921" cy="423761"/>
+          </a:xfrm>
+          <a:prstGeom prst="rect">
+            <a:avLst/>
+          </a:prstGeom>
+          <a:solidFill>
+            <a:schemeClr val="bg2">
+              <a:lumMod val="50000"/>
+            </a:schemeClr>
+          </a:solidFill>
+          <a:ln>
+            <a:solidFill>
+              <a:schemeClr val="bg2">
+                <a:lumMod val="50000"/>
+              </a:schemeClr>
+            </a:solidFill>
+          </a:ln>
+        </p:spPr>
+        <p:style>
+          <a:lnRef idx="2">
+            <a:schemeClr val="accent1">
+              <a:shade val="50000"/>
+            </a:schemeClr>
+          </a:lnRef>
+          <a:fillRef idx="1">
+            <a:schemeClr val="accent1"/>
+          </a:fillRef>
+          <a:effectRef idx="0">
+            <a:schemeClr val="accent1"/>
+          </a:effectRef>
+          <a:fontRef idx="minor">
+            <a:schemeClr val="lt1"/>
+          </a:fontRef>
+        </p:style>
+        <p:txBody>
+          <a:bodyPr rtlCol="0" anchor="ctr"/>
+          <a:lstStyle/>
+          <a:p>
+            <a:pPr algn="ctr"/>
+            <a:endParaRPr lang="en-US"/>
+          </a:p>
+        </p:txBody>
+      </p:sp>
+      <p:cxnSp>
+        <p:nvCxnSpPr>
+          <p:cNvPr id="7" name="直接连接符 6">
+            <a:extLst>
+              <a:ext uri="{FF2B5EF4-FFF2-40B4-BE49-F238E27FC236}">
+                <a16:creationId xmlns:a16="http://schemas.microsoft.com/office/drawing/2014/main" id="{211E95CE-5836-474C-9F7F-47E1627729E6}"/>
+              </a:ext>
+            </a:extLst>
+          </p:cNvPr>
+          <p:cNvCxnSpPr/>
+          <p:nvPr/>
+        </p:nvCxnSpPr>
+        <p:spPr>
+          <a:xfrm flipH="1">
+            <a:off x="3211286" y="2057400"/>
+            <a:ext cx="1981200" cy="2189480"/>
+          </a:xfrm>
+          <a:prstGeom prst="line">
+            <a:avLst/>
+          </a:prstGeom>
+          <a:ln w="19050" cap="flat" cmpd="sng" algn="ctr">
+            <a:solidFill>
+              <a:schemeClr val="accent3"/>
+            </a:solidFill>
+            <a:prstDash val="dash"/>
+            <a:round/>
+            <a:headEnd type="none" w="med" len="med"/>
+            <a:tailEnd type="none" w="med" len="med"/>
+          </a:ln>
+        </p:spPr>
+        <p:style>
+          <a:lnRef idx="0">
+            <a:scrgbClr r="0" g="0" b="0"/>
+          </a:lnRef>
+          <a:fillRef idx="0">
+            <a:scrgbClr r="0" g="0" b="0"/>
+          </a:fillRef>
+          <a:effectRef idx="0">
+            <a:scrgbClr r="0" g="0" b="0"/>
+          </a:effectRef>
+          <a:fontRef idx="minor">
+            <a:schemeClr val="tx1"/>
+          </a:fontRef>
+        </p:style>
+      </p:cxnSp>
+      <p:cxnSp>
+        <p:nvCxnSpPr>
+          <p:cNvPr id="10" name="直接连接符 9">
+            <a:extLst>
+              <a:ext uri="{FF2B5EF4-FFF2-40B4-BE49-F238E27FC236}">
+                <a16:creationId xmlns:a16="http://schemas.microsoft.com/office/drawing/2014/main" id="{4D3700E6-D921-48FC-B787-8DCA5789C785}"/>
+              </a:ext>
+            </a:extLst>
+          </p:cNvPr>
+          <p:cNvCxnSpPr/>
+          <p:nvPr/>
+        </p:nvCxnSpPr>
+        <p:spPr>
+          <a:xfrm>
+            <a:off x="5475514" y="2057400"/>
+            <a:ext cx="3559629" cy="2189480"/>
+          </a:xfrm>
+          <a:prstGeom prst="line">
+            <a:avLst/>
+          </a:prstGeom>
+          <a:ln w="19050" cap="flat" cmpd="sng" algn="ctr">
+            <a:solidFill>
+              <a:schemeClr val="accent3"/>
+            </a:solidFill>
+            <a:prstDash val="dash"/>
+            <a:round/>
+            <a:headEnd type="none" w="med" len="med"/>
+            <a:tailEnd type="none" w="med" len="med"/>
+          </a:ln>
+        </p:spPr>
+        <p:style>
+          <a:lnRef idx="0">
+            <a:scrgbClr r="0" g="0" b="0"/>
+          </a:lnRef>
+          <a:fillRef idx="0">
+            <a:scrgbClr r="0" g="0" b="0"/>
+          </a:fillRef>
+          <a:effectRef idx="0">
+            <a:scrgbClr r="0" g="0" b="0"/>
+          </a:effectRef>
+          <a:fontRef idx="minor">
+            <a:schemeClr val="tx1"/>
+          </a:fontRef>
+        </p:style>
+      </p:cxnSp>
+      <p:sp>
+        <p:nvSpPr>
+          <p:cNvPr id="34" name="文本框 33">
+            <a:extLst>
+              <a:ext uri="{FF2B5EF4-FFF2-40B4-BE49-F238E27FC236}">
+                <a16:creationId xmlns:a16="http://schemas.microsoft.com/office/drawing/2014/main" id="{6462C83B-3201-40EE-A75B-97C99B2BCCB3}"/>
+              </a:ext>
+            </a:extLst>
+          </p:cNvPr>
+          <p:cNvSpPr txBox="1"/>
+          <p:nvPr/>
+        </p:nvSpPr>
+        <p:spPr>
+          <a:xfrm>
+            <a:off x="3211286" y="6055187"/>
+            <a:ext cx="1380506" cy="400110"/>
+          </a:xfrm>
+          <a:prstGeom prst="rect">
+            <a:avLst/>
+          </a:prstGeom>
+          <a:noFill/>
+        </p:spPr>
+        <p:txBody>
+          <a:bodyPr wrap="none" rtlCol="0">
+            <a:spAutoFit/>
+          </a:bodyPr>
+          <a:lstStyle/>
+          <a:p>
+            <a:r>
+              <a:rPr lang="en-US" altLang="zh-CN" sz="2000" b="1">
+                <a:solidFill>
+                  <a:schemeClr val="bg1">
+                    <a:lumMod val="65000"/>
+                  </a:schemeClr>
+                </a:solidFill>
+              </a:rPr>
+              <a:t>0x5B(</a:t>
+            </a:r>
+            <a:r>
+              <a:rPr lang="zh-CN" altLang="en-US" b="1">
+                <a:solidFill>
+                  <a:schemeClr val="bg1">
+                    <a:lumMod val="65000"/>
+                  </a:schemeClr>
+                </a:solidFill>
+              </a:rPr>
+              <a:t>默认</a:t>
+            </a:r>
+            <a:r>
+              <a:rPr lang="en-US" altLang="zh-CN" sz="2000" b="1">
+                <a:solidFill>
+                  <a:schemeClr val="bg1">
+                    <a:lumMod val="65000"/>
+                  </a:schemeClr>
+                </a:solidFill>
+              </a:rPr>
+              <a:t>)</a:t>
+            </a:r>
+            <a:endParaRPr lang="en-US" sz="2000" b="1">
+              <a:solidFill>
+                <a:schemeClr val="bg1">
+                  <a:lumMod val="65000"/>
+                </a:schemeClr>
+              </a:solidFill>
+            </a:endParaRPr>
+          </a:p>
+        </p:txBody>
+      </p:sp>
+      <p:sp>
+        <p:nvSpPr>
+          <p:cNvPr id="40" name="文本框 39">
+            <a:extLst>
+              <a:ext uri="{FF2B5EF4-FFF2-40B4-BE49-F238E27FC236}">
+                <a16:creationId xmlns:a16="http://schemas.microsoft.com/office/drawing/2014/main" id="{D067F5A3-AF59-429D-95BD-D9CDD3ECEC2A}"/>
+              </a:ext>
+            </a:extLst>
+          </p:cNvPr>
+          <p:cNvSpPr txBox="1"/>
+          <p:nvPr/>
+        </p:nvSpPr>
+        <p:spPr>
+          <a:xfrm>
+            <a:off x="5829186" y="6055187"/>
+            <a:ext cx="724878" cy="400110"/>
+          </a:xfrm>
+          <a:prstGeom prst="rect">
+            <a:avLst/>
+          </a:prstGeom>
+          <a:noFill/>
+        </p:spPr>
+        <p:txBody>
+          <a:bodyPr wrap="none" rtlCol="0">
+            <a:spAutoFit/>
+          </a:bodyPr>
+          <a:lstStyle/>
+          <a:p>
+            <a:r>
+              <a:rPr lang="en-US" altLang="zh-CN" sz="2000" b="1">
+                <a:solidFill>
+                  <a:schemeClr val="bg1">
+                    <a:lumMod val="65000"/>
+                  </a:schemeClr>
+                </a:solidFill>
+              </a:rPr>
+              <a:t>0x5D</a:t>
+            </a:r>
+            <a:endParaRPr lang="en-US" sz="2000" b="1">
+              <a:solidFill>
+                <a:schemeClr val="bg1">
+                  <a:lumMod val="65000"/>
+                </a:schemeClr>
+              </a:solidFill>
+            </a:endParaRPr>
+          </a:p>
+        </p:txBody>
+      </p:sp>
+      <p:sp>
+        <p:nvSpPr>
+          <p:cNvPr id="41" name="文本框 40">
+            <a:extLst>
+              <a:ext uri="{FF2B5EF4-FFF2-40B4-BE49-F238E27FC236}">
+                <a16:creationId xmlns:a16="http://schemas.microsoft.com/office/drawing/2014/main" id="{BB391894-F719-447B-B9E4-836D204309CC}"/>
+              </a:ext>
+            </a:extLst>
+          </p:cNvPr>
+          <p:cNvSpPr txBox="1"/>
+          <p:nvPr/>
+        </p:nvSpPr>
+        <p:spPr>
+          <a:xfrm>
+            <a:off x="8447086" y="6055187"/>
+            <a:ext cx="699230" cy="400110"/>
+          </a:xfrm>
+          <a:prstGeom prst="rect">
+            <a:avLst/>
+          </a:prstGeom>
+          <a:noFill/>
+        </p:spPr>
+        <p:txBody>
+          <a:bodyPr wrap="none" rtlCol="0">
+            <a:spAutoFit/>
+          </a:bodyPr>
+          <a:lstStyle/>
+          <a:p>
+            <a:r>
+              <a:rPr lang="en-US" altLang="zh-CN" sz="2000" b="1">
+                <a:solidFill>
+                  <a:schemeClr val="bg1">
+                    <a:lumMod val="65000"/>
+                  </a:schemeClr>
+                </a:solidFill>
+              </a:rPr>
+              <a:t>0x5C</a:t>
+            </a:r>
+            <a:endParaRPr lang="en-US" sz="2000" b="1">
+              <a:solidFill>
+                <a:schemeClr val="bg1">
+                  <a:lumMod val="65000"/>
+                </a:schemeClr>
+              </a:solidFill>
+            </a:endParaRPr>
+          </a:p>
+        </p:txBody>
+      </p:sp>
+      <p:sp>
+        <p:nvSpPr>
+          <p:cNvPr id="42" name="文本框 41">
+            <a:extLst>
+              <a:ext uri="{FF2B5EF4-FFF2-40B4-BE49-F238E27FC236}">
+                <a16:creationId xmlns:a16="http://schemas.microsoft.com/office/drawing/2014/main" id="{B95A4A94-D196-4779-AF0B-2A5D134BE8E1}"/>
+              </a:ext>
+            </a:extLst>
+          </p:cNvPr>
+          <p:cNvSpPr txBox="1"/>
+          <p:nvPr/>
+        </p:nvSpPr>
+        <p:spPr>
+          <a:xfrm>
+            <a:off x="3211286" y="581711"/>
+            <a:ext cx="1039067" cy="400110"/>
+          </a:xfrm>
+          <a:prstGeom prst="rect">
+            <a:avLst/>
+          </a:prstGeom>
+          <a:noFill/>
+        </p:spPr>
+        <p:txBody>
+          <a:bodyPr wrap="none" rtlCol="0">
+            <a:spAutoFit/>
+          </a:bodyPr>
+          <a:lstStyle/>
+          <a:p>
+            <a:r>
+              <a:rPr lang="en-US" altLang="zh-CN" sz="2000" b="1">
+                <a:solidFill>
+                  <a:schemeClr val="bg1">
+                    <a:lumMod val="65000"/>
+                  </a:schemeClr>
+                </a:solidFill>
+              </a:rPr>
+              <a:t>I2C </a:t>
+            </a:r>
+            <a:r>
+              <a:rPr lang="zh-CN" altLang="en-US" b="1">
+                <a:solidFill>
+                  <a:schemeClr val="bg1">
+                    <a:lumMod val="65000"/>
+                  </a:schemeClr>
+                </a:solidFill>
+              </a:rPr>
+              <a:t>地址</a:t>
+            </a:r>
+            <a:endParaRPr lang="en-US" sz="2000" b="1">
+              <a:solidFill>
+                <a:schemeClr val="bg1">
+                  <a:lumMod val="65000"/>
+                </a:schemeClr>
+              </a:solidFill>
+            </a:endParaRPr>
+          </a:p>
+        </p:txBody>
+      </p:sp>
+    </p:spTree>
+    <p:extLst>
+      <p:ext uri="{BB962C8B-B14F-4D97-AF65-F5344CB8AC3E}">
+        <p14:creationId xmlns:p14="http://schemas.microsoft.com/office/powerpoint/2010/main" val="3086490304"/>
+      </p:ext>
+    </p:extLst>
+  </p:cSld>
+  <p:clrMapOvr>
+    <a:masterClrMapping/>
+  </p:clrMapOvr>
+</p:sld>
+</file>
+
 <file path=ppt/theme/theme1.xml><?xml version="1.0" encoding="utf-8"?>
 <a:theme xmlns:a="http://schemas.openxmlformats.org/drawingml/2006/main" name="Office 主题​​">
   <a:themeElements>

</xml_diff>

<commit_message>
chinese version of pin map
</commit_message>
<xml_diff>
--- a/img/pin_map_2040.pptx
+++ b/img/pin_map_2040.pptx
@@ -7846,11 +7846,35 @@
                 <a:ea typeface="华文楷体" panose="02010600040101010101" pitchFamily="2" charset="-122"/>
                 <a:cs typeface="Leelawadee UI" panose="020B0502040204020203" pitchFamily="34" charset="-34"/>
               </a:rPr>
-              <a:t>将模块连接至系统上</a:t>
+              <a:t>将模块的 </a:t>
+            </a:r>
+            <a:r>
+              <a:rPr lang="en-US" altLang="zh-CN" sz="1600">
+                <a:latin typeface="Leelawadee UI" panose="020B0502040204020203" pitchFamily="34" charset="-34"/>
+                <a:ea typeface="Microsoft JhengHei Light" panose="020B0304030504040204" pitchFamily="34" charset="-120"/>
+                <a:cs typeface="Leelawadee UI" panose="020B0502040204020203" pitchFamily="34" charset="-34"/>
+              </a:rPr>
+              <a:t>GND</a:t>
+            </a:r>
+            <a:r>
+              <a:rPr lang="zh-CN" altLang="en-US" sz="1600">
+                <a:latin typeface="华文楷体" panose="02010600040101010101" pitchFamily="2" charset="-122"/>
+                <a:ea typeface="华文楷体" panose="02010600040101010101" pitchFamily="2" charset="-122"/>
+                <a:cs typeface="Leelawadee UI" panose="020B0502040204020203" pitchFamily="34" charset="-34"/>
+              </a:rPr>
+              <a:t>连接至系统的 </a:t>
+            </a:r>
+            <a:r>
+              <a:rPr lang="en-US" altLang="zh-CN" sz="1600">
+                <a:latin typeface="Leelawadee UI" panose="020B0502040204020203" pitchFamily="34" charset="-34"/>
+                <a:ea typeface="Microsoft JhengHei Light" panose="020B0304030504040204" pitchFamily="34" charset="-120"/>
+                <a:cs typeface="Leelawadee UI" panose="020B0502040204020203" pitchFamily="34" charset="-34"/>
+              </a:rPr>
+              <a:t>GND</a:t>
             </a:r>
             <a:endParaRPr lang="en-US" sz="1600">
-              <a:latin typeface="华文楷体" panose="02010600040101010101" pitchFamily="2" charset="-122"/>
-              <a:ea typeface="华文楷体" panose="02010600040101010101" pitchFamily="2" charset="-122"/>
+              <a:latin typeface="Leelawadee UI" panose="020B0502040204020203" pitchFamily="34" charset="-34"/>
+              <a:ea typeface="Microsoft JhengHei Light" panose="020B0304030504040204" pitchFamily="34" charset="-120"/>
               <a:cs typeface="Leelawadee UI" panose="020B0502040204020203" pitchFamily="34" charset="-34"/>
             </a:endParaRPr>
           </a:p>
@@ -7882,7 +7906,23 @@
                 <a:ea typeface="华文楷体" panose="02010600040101010101" pitchFamily="2" charset="-122"/>
                 <a:cs typeface="Leelawadee UI" panose="020B0502040204020203" pitchFamily="34" charset="-34"/>
               </a:rPr>
-              <a:t> 5V </a:t>
+              <a:t> </a:t>
+            </a:r>
+            <a:r>
+              <a:rPr lang="en-US" sz="1600">
+                <a:latin typeface="Leelawadee UI" panose="020B0502040204020203" pitchFamily="34" charset="-34"/>
+                <a:ea typeface="Microsoft JhengHei Light" panose="020B0304030504040204" pitchFamily="34" charset="-120"/>
+                <a:cs typeface="Leelawadee UI" panose="020B0502040204020203" pitchFamily="34" charset="-34"/>
+              </a:rPr>
+              <a:t>5V</a:t>
+            </a:r>
+            <a:r>
+              <a:rPr lang="en-US" sz="1600">
+                <a:latin typeface="华文楷体" panose="02010600040101010101" pitchFamily="2" charset="-122"/>
+                <a:ea typeface="华文楷体" panose="02010600040101010101" pitchFamily="2" charset="-122"/>
+                <a:cs typeface="Leelawadee UI" panose="020B0502040204020203" pitchFamily="34" charset="-34"/>
+              </a:rPr>
+              <a:t> </a:t>
             </a:r>
             <a:r>
               <a:rPr lang="zh-CN" altLang="en-US" sz="1600">
@@ -7898,7 +7938,23 @@
                 <a:ea typeface="华文楷体" panose="02010600040101010101" pitchFamily="2" charset="-122"/>
                 <a:cs typeface="Leelawadee UI" panose="020B0502040204020203" pitchFamily="34" charset="-34"/>
               </a:rPr>
-              <a:t> 3.3V </a:t>
+              <a:t> </a:t>
+            </a:r>
+            <a:r>
+              <a:rPr lang="en-US" sz="1600">
+                <a:latin typeface="Leelawadee UI" panose="020B0502040204020203" pitchFamily="34" charset="-34"/>
+                <a:ea typeface="Microsoft JhengHei Light" panose="020B0304030504040204" pitchFamily="34" charset="-120"/>
+                <a:cs typeface="Leelawadee UI" panose="020B0502040204020203" pitchFamily="34" charset="-34"/>
+              </a:rPr>
+              <a:t>3.3V</a:t>
+            </a:r>
+            <a:r>
+              <a:rPr lang="en-US" sz="1600">
+                <a:latin typeface="华文楷体" panose="02010600040101010101" pitchFamily="2" charset="-122"/>
+                <a:ea typeface="华文楷体" panose="02010600040101010101" pitchFamily="2" charset="-122"/>
+                <a:cs typeface="Leelawadee UI" panose="020B0502040204020203" pitchFamily="34" charset="-34"/>
+              </a:rPr>
+              <a:t> </a:t>
             </a:r>
             <a:r>
               <a:rPr lang="zh-CN" altLang="en-US" sz="1600">

</xml_diff>